<commit_message>
slides -- add links to remote content
</commit_message>
<xml_diff>
--- a/slides.pptx
+++ b/slides.pptx
@@ -11970,15 +11970,7 @@
           <a:p>
             <a:r>
               <a:rPr lang="en-US" b="1" dirty="0" smtClean="0"/>
-              <a:t>Lesson </a:t>
-            </a:r>
-            <a:r>
-              <a:rPr lang="en-US" b="1" dirty="0" smtClean="0"/>
-              <a:t>2: Colored Triangle </a:t>
-            </a:r>
-            <a:r>
-              <a:rPr lang="en-US" b="1" dirty="0" smtClean="0"/>
-              <a:t>and Quad</a:t>
+              <a:t>Lesson 2: Colored Triangle and Quad</a:t>
             </a:r>
             <a:endParaRPr lang="en-US" b="1" dirty="0"/>
           </a:p>
@@ -12070,19 +12062,7 @@
           <a:p>
             <a:r>
               <a:rPr lang="en-US" b="1" dirty="0" smtClean="0"/>
-              <a:t>Lesson </a:t>
-            </a:r>
-            <a:r>
-              <a:rPr lang="en-US" b="1" dirty="0" smtClean="0"/>
-              <a:t>2: Colored Triangle </a:t>
-            </a:r>
-            <a:r>
-              <a:rPr lang="en-US" b="1" dirty="0" smtClean="0"/>
-              <a:t>and </a:t>
-            </a:r>
-            <a:r>
-              <a:rPr lang="en-US" b="1" dirty="0" smtClean="0"/>
-              <a:t>Quad</a:t>
+              <a:t>Lesson 2: Colored Triangle and Quad</a:t>
             </a:r>
             <a:endParaRPr lang="en-US" b="1" dirty="0"/>
           </a:p>
@@ -12728,19 +12708,7 @@
           <a:p>
             <a:r>
               <a:rPr lang="en-US" b="1" dirty="0" smtClean="0"/>
-              <a:t>Lesson </a:t>
-            </a:r>
-            <a:r>
-              <a:rPr lang="en-US" b="1" dirty="0" smtClean="0"/>
-              <a:t>2: Colored Triangle </a:t>
-            </a:r>
-            <a:r>
-              <a:rPr lang="en-US" b="1" dirty="0" smtClean="0"/>
-              <a:t>and </a:t>
-            </a:r>
-            <a:r>
-              <a:rPr lang="en-US" b="1" dirty="0" smtClean="0"/>
-              <a:t>Quad</a:t>
+              <a:t>Lesson 2: Colored Triangle and Quad</a:t>
             </a:r>
             <a:endParaRPr lang="en-US" b="1" dirty="0"/>
           </a:p>
@@ -13249,19 +13217,7 @@
           <a:p>
             <a:r>
               <a:rPr lang="en-US" b="1" dirty="0" smtClean="0"/>
-              <a:t>Lesson </a:t>
-            </a:r>
-            <a:r>
-              <a:rPr lang="en-US" b="1" dirty="0" smtClean="0"/>
-              <a:t>2: Colored Triangle </a:t>
-            </a:r>
-            <a:r>
-              <a:rPr lang="en-US" b="1" dirty="0" smtClean="0"/>
-              <a:t>and </a:t>
-            </a:r>
-            <a:r>
-              <a:rPr lang="en-US" b="1" dirty="0" smtClean="0"/>
-              <a:t>Quad</a:t>
+              <a:t>Lesson 2: Colored Triangle and Quad</a:t>
             </a:r>
             <a:endParaRPr lang="en-US" b="1" dirty="0"/>
           </a:p>
@@ -13731,19 +13687,7 @@
           <a:p>
             <a:r>
               <a:rPr lang="en-US" b="1" dirty="0" smtClean="0"/>
-              <a:t>Lesson </a:t>
-            </a:r>
-            <a:r>
-              <a:rPr lang="en-US" b="1" dirty="0" smtClean="0"/>
-              <a:t>2: Colored Triangle </a:t>
-            </a:r>
-            <a:r>
-              <a:rPr lang="en-US" b="1" dirty="0" smtClean="0"/>
-              <a:t>and </a:t>
-            </a:r>
-            <a:r>
-              <a:rPr lang="en-US" b="1" dirty="0" smtClean="0"/>
-              <a:t>Quad</a:t>
+              <a:t>Lesson 2: Colored Triangle and Quad</a:t>
             </a:r>
             <a:endParaRPr lang="en-US" b="1" dirty="0"/>
           </a:p>
@@ -14184,19 +14128,7 @@
           <a:p>
             <a:r>
               <a:rPr lang="en-US" b="1" dirty="0" smtClean="0"/>
-              <a:t>Lesson </a:t>
-            </a:r>
-            <a:r>
-              <a:rPr lang="en-US" b="1" dirty="0" smtClean="0"/>
-              <a:t>2: Colored Triangle </a:t>
-            </a:r>
-            <a:r>
-              <a:rPr lang="en-US" b="1" dirty="0" smtClean="0"/>
-              <a:t>and </a:t>
-            </a:r>
-            <a:r>
-              <a:rPr lang="en-US" b="1" dirty="0" smtClean="0"/>
-              <a:t>Quad</a:t>
+              <a:t>Lesson 2: Colored Triangle and Quad</a:t>
             </a:r>
             <a:endParaRPr lang="en-US" b="1" dirty="0"/>
           </a:p>
@@ -14827,19 +14759,7 @@
           <a:p>
             <a:r>
               <a:rPr lang="en-US" b="1" dirty="0" smtClean="0"/>
-              <a:t>Lesson </a:t>
-            </a:r>
-            <a:r>
-              <a:rPr lang="en-US" b="1" dirty="0" smtClean="0"/>
-              <a:t>2: Colored Triangle </a:t>
-            </a:r>
-            <a:r>
-              <a:rPr lang="en-US" b="1" dirty="0" smtClean="0"/>
-              <a:t>and </a:t>
-            </a:r>
-            <a:r>
-              <a:rPr lang="en-US" b="1" dirty="0" smtClean="0"/>
-              <a:t>Quad</a:t>
+              <a:t>Lesson 2: Colored Triangle and Quad</a:t>
             </a:r>
             <a:endParaRPr lang="en-US" b="1" dirty="0"/>
           </a:p>
@@ -15116,19 +15036,7 @@
           <a:p>
             <a:r>
               <a:rPr lang="en-US" b="1" dirty="0" smtClean="0"/>
-              <a:t>Lesson </a:t>
-            </a:r>
-            <a:r>
-              <a:rPr lang="en-US" b="1" dirty="0" smtClean="0"/>
-              <a:t>2: Colored Triangle </a:t>
-            </a:r>
-            <a:r>
-              <a:rPr lang="en-US" b="1" dirty="0" smtClean="0"/>
-              <a:t>and </a:t>
-            </a:r>
-            <a:r>
-              <a:rPr lang="en-US" b="1" dirty="0" smtClean="0"/>
-              <a:t>Quad</a:t>
+              <a:t>Lesson 2: Colored Triangle and Quad</a:t>
             </a:r>
             <a:endParaRPr lang="en-US" b="1" dirty="0"/>
           </a:p>
@@ -15840,11 +15748,7 @@
           <a:p>
             <a:r>
               <a:rPr lang="en-US" b="1" dirty="0" smtClean="0"/>
-              <a:t>Lesson </a:t>
-            </a:r>
-            <a:r>
-              <a:rPr lang="en-US" b="1" dirty="0" smtClean="0"/>
-              <a:t>2: Movement</a:t>
+              <a:t>Lesson 2: Movement</a:t>
             </a:r>
             <a:endParaRPr lang="en-US" b="1" dirty="0"/>
           </a:p>
@@ -15944,15 +15848,7 @@
             </a:r>
             <a:r>
               <a:rPr lang="en-US" b="1" dirty="0" smtClean="0"/>
-              <a:t>: Colored Triangle </a:t>
-            </a:r>
-            <a:r>
-              <a:rPr lang="en-US" b="1" dirty="0" smtClean="0"/>
-              <a:t>and </a:t>
-            </a:r>
-            <a:r>
-              <a:rPr lang="en-US" b="1" dirty="0" smtClean="0"/>
-              <a:t>Quad</a:t>
+              <a:t>: Colored Triangle and Quad</a:t>
             </a:r>
             <a:endParaRPr lang="en-US" b="1" dirty="0"/>
           </a:p>
@@ -16219,15 +16115,7 @@
             </a:r>
             <a:r>
               <a:rPr lang="en-US" b="1" dirty="0" smtClean="0"/>
-              <a:t>: Colored Triangle </a:t>
-            </a:r>
-            <a:r>
-              <a:rPr lang="en-US" b="1" dirty="0" smtClean="0"/>
-              <a:t>and </a:t>
-            </a:r>
-            <a:r>
-              <a:rPr lang="en-US" b="1" dirty="0" smtClean="0"/>
-              <a:t>Quad</a:t>
+              <a:t>: Colored Triangle and Quad</a:t>
             </a:r>
             <a:endParaRPr lang="en-US" b="1" dirty="0"/>
           </a:p>
@@ -16606,15 +16494,7 @@
             </a:r>
             <a:r>
               <a:rPr lang="en-US" b="1" dirty="0" smtClean="0"/>
-              <a:t>: Colored Triangle </a:t>
-            </a:r>
-            <a:r>
-              <a:rPr lang="en-US" b="1" dirty="0" smtClean="0"/>
-              <a:t>and </a:t>
-            </a:r>
-            <a:r>
-              <a:rPr lang="en-US" b="1" dirty="0" smtClean="0"/>
-              <a:t>Quad</a:t>
+              <a:t>: Colored Triangle and Quad</a:t>
             </a:r>
             <a:endParaRPr lang="en-US" b="1" dirty="0"/>
           </a:p>
@@ -16898,15 +16778,7 @@
             </a:r>
             <a:r>
               <a:rPr lang="en-US" b="1" dirty="0" smtClean="0"/>
-              <a:t>: Colored Triangle </a:t>
-            </a:r>
-            <a:r>
-              <a:rPr lang="en-US" b="1" dirty="0" smtClean="0"/>
-              <a:t>and </a:t>
-            </a:r>
-            <a:r>
-              <a:rPr lang="en-US" b="1" dirty="0" smtClean="0"/>
-              <a:t>Quad</a:t>
+              <a:t>: Colored Triangle and Quad</a:t>
             </a:r>
             <a:endParaRPr lang="en-US" b="1" dirty="0"/>
           </a:p>
@@ -17475,15 +17347,7 @@
             </a:r>
             <a:r>
               <a:rPr lang="en-US" b="1" dirty="0" smtClean="0"/>
-              <a:t>: Colored Triangle </a:t>
-            </a:r>
-            <a:r>
-              <a:rPr lang="en-US" b="1" dirty="0" smtClean="0"/>
-              <a:t>and </a:t>
-            </a:r>
-            <a:r>
-              <a:rPr lang="en-US" b="1" dirty="0" smtClean="0"/>
-              <a:t>Quad</a:t>
+              <a:t>: Colored Triangle and Quad</a:t>
             </a:r>
             <a:endParaRPr lang="en-US" b="1" dirty="0"/>
           </a:p>
@@ -17905,15 +17769,7 @@
             </a:r>
             <a:r>
               <a:rPr lang="en-US" b="1" dirty="0" smtClean="0"/>
-              <a:t>: Colored Triangle </a:t>
-            </a:r>
-            <a:r>
-              <a:rPr lang="en-US" b="1" dirty="0" smtClean="0"/>
-              <a:t>and </a:t>
-            </a:r>
-            <a:r>
-              <a:rPr lang="en-US" b="1" dirty="0" smtClean="0"/>
-              <a:t>Quad</a:t>
+              <a:t>: Colored Triangle and Quad</a:t>
             </a:r>
             <a:endParaRPr lang="en-US" b="1" dirty="0"/>
           </a:p>
@@ -18857,21 +18713,9 @@
               </a:rPr>
               <a:t>/</a:t>
             </a:r>
-          </a:p>
-          <a:p>
-            <a:r>
-              <a:rPr lang="en-US" dirty="0" smtClean="0"/>
-              <a:t>The links in later slides assume that a local server</a:t>
-            </a:r>
-            <a:r>
-              <a:rPr lang="en-US" dirty="0"/>
-              <a:t> </a:t>
-            </a:r>
-            <a:r>
-              <a:rPr lang="en-US" dirty="0" smtClean="0"/>
-              <a:t>has been created in this manner.</a:t>
-            </a:r>
-            <a:endParaRPr lang="en-US" dirty="0" smtClean="0"/>
+            <a:endParaRPr lang="en-US" dirty="0" smtClean="0">
+              <a:hlinkClick r:id="rId3"/>
+            </a:endParaRPr>
           </a:p>
         </p:txBody>
       </p:sp>
@@ -19902,14 +19746,33 @@
           <a:lstStyle/>
           <a:p>
             <a:r>
+              <a:rPr lang="en-US" dirty="0" smtClean="0"/>
+              <a:t>Local Web server links:</a:t>
+            </a:r>
+            <a:r>
               <a:rPr lang="en-US" dirty="0" smtClean="0">
                 <a:hlinkClick r:id="rId2"/>
               </a:rPr>
-              <a:t>WebGL lesson</a:t>
+              <a:t/>
+            </a:r>
+            <a:br>
+              <a:rPr lang="en-US" dirty="0" smtClean="0">
+                <a:hlinkClick r:id="rId2"/>
+              </a:rPr>
+            </a:br>
+            <a:r>
+              <a:rPr lang="en-US" dirty="0" smtClean="0">
+                <a:hlinkClick r:id="rId2"/>
+              </a:rPr>
+              <a:t>WebGL lesson 1</a:t>
             </a:r>
             <a:r>
               <a:rPr lang="en-US" dirty="0" smtClean="0"/>
-              <a:t> (also, </a:t>
+              <a:t> </a:t>
+            </a:r>
+            <a:r>
+              <a:rPr lang="en-US" dirty="0" smtClean="0"/>
+              <a:t>(also, </a:t>
             </a:r>
             <a:r>
               <a:rPr lang="en-US" dirty="0" smtClean="0">
@@ -19919,6 +19782,50 @@
             </a:r>
             <a:r>
               <a:rPr lang="en-US" dirty="0" smtClean="0"/>
+              <a:t>)</a:t>
+            </a:r>
+          </a:p>
+          <a:p>
+            <a:endParaRPr lang="en-US" dirty="0" smtClean="0"/>
+          </a:p>
+          <a:p>
+            <a:r>
+              <a:rPr lang="en-US" dirty="0" smtClean="0"/>
+              <a:t>Web links</a:t>
+            </a:r>
+            <a:r>
+              <a:rPr lang="en-US" dirty="0"/>
+              <a:t>:</a:t>
+            </a:r>
+            <a:r>
+              <a:rPr lang="en-US" dirty="0">
+                <a:hlinkClick r:id="rId4"/>
+              </a:rPr>
+              <a:t/>
+            </a:r>
+            <a:br>
+              <a:rPr lang="en-US" dirty="0">
+                <a:hlinkClick r:id="rId4"/>
+              </a:rPr>
+            </a:br>
+            <a:r>
+              <a:rPr lang="en-US" dirty="0">
+                <a:hlinkClick r:id="rId4"/>
+              </a:rPr>
+              <a:t>WebGL lesson 1</a:t>
+            </a:r>
+            <a:r>
+              <a:rPr lang="en-US" dirty="0"/>
+              <a:t> (also, </a:t>
+            </a:r>
+            <a:r>
+              <a:rPr lang="en-US" dirty="0">
+                <a:hlinkClick r:id="rId5" action="ppaction://hlinkfile"/>
+              </a:rPr>
+              <a:t>view source</a:t>
+            </a:r>
+            <a:r>
+              <a:rPr lang="en-US" dirty="0"/>
               <a:t>)</a:t>
             </a:r>
           </a:p>

</xml_diff>

<commit_message>
add more three.js examples
</commit_message>
<xml_diff>
--- a/slides.pptx
+++ b/slides.pptx
@@ -43,9 +43,20 @@
     <p:sldId id="295" r:id="rId37"/>
     <p:sldId id="296" r:id="rId38"/>
     <p:sldId id="298" r:id="rId39"/>
-    <p:sldId id="297" r:id="rId40"/>
-    <p:sldId id="262" r:id="rId41"/>
-    <p:sldId id="261" r:id="rId42"/>
+    <p:sldId id="300" r:id="rId40"/>
+    <p:sldId id="301" r:id="rId41"/>
+    <p:sldId id="299" r:id="rId42"/>
+    <p:sldId id="302" r:id="rId43"/>
+    <p:sldId id="303" r:id="rId44"/>
+    <p:sldId id="304" r:id="rId45"/>
+    <p:sldId id="305" r:id="rId46"/>
+    <p:sldId id="306" r:id="rId47"/>
+    <p:sldId id="307" r:id="rId48"/>
+    <p:sldId id="308" r:id="rId49"/>
+    <p:sldId id="309" r:id="rId50"/>
+    <p:sldId id="297" r:id="rId51"/>
+    <p:sldId id="262" r:id="rId52"/>
+    <p:sldId id="261" r:id="rId53"/>
   </p:sldIdLst>
   <p:sldSz cx="9144000" cy="6858000" type="screen4x3"/>
   <p:notesSz cx="6858000" cy="9144000"/>
@@ -328,7 +339,7 @@
           <a:p>
             <a:fld id="{0B44415A-ED4C-F049-B1EC-6403452F0569}" type="datetimeFigureOut">
               <a:rPr lang="en-US" smtClean="0"/>
-              <a:t>4/16/15</a:t>
+              <a:t>4/21/15</a:t>
             </a:fld>
             <a:endParaRPr lang="en-US"/>
           </a:p>
@@ -498,7 +509,7 @@
           <a:p>
             <a:fld id="{0B44415A-ED4C-F049-B1EC-6403452F0569}" type="datetimeFigureOut">
               <a:rPr lang="en-US" smtClean="0"/>
-              <a:t>4/16/15</a:t>
+              <a:t>4/21/15</a:t>
             </a:fld>
             <a:endParaRPr lang="en-US"/>
           </a:p>
@@ -678,7 +689,7 @@
           <a:p>
             <a:fld id="{0B44415A-ED4C-F049-B1EC-6403452F0569}" type="datetimeFigureOut">
               <a:rPr lang="en-US" smtClean="0"/>
-              <a:t>4/16/15</a:t>
+              <a:t>4/21/15</a:t>
             </a:fld>
             <a:endParaRPr lang="en-US"/>
           </a:p>
@@ -848,7 +859,7 @@
           <a:p>
             <a:fld id="{0B44415A-ED4C-F049-B1EC-6403452F0569}" type="datetimeFigureOut">
               <a:rPr lang="en-US" smtClean="0"/>
-              <a:t>4/16/15</a:t>
+              <a:t>4/21/15</a:t>
             </a:fld>
             <a:endParaRPr lang="en-US"/>
           </a:p>
@@ -1094,7 +1105,7 @@
           <a:p>
             <a:fld id="{0B44415A-ED4C-F049-B1EC-6403452F0569}" type="datetimeFigureOut">
               <a:rPr lang="en-US" smtClean="0"/>
-              <a:t>4/16/15</a:t>
+              <a:t>4/21/15</a:t>
             </a:fld>
             <a:endParaRPr lang="en-US"/>
           </a:p>
@@ -1382,7 +1393,7 @@
           <a:p>
             <a:fld id="{0B44415A-ED4C-F049-B1EC-6403452F0569}" type="datetimeFigureOut">
               <a:rPr lang="en-US" smtClean="0"/>
-              <a:t>4/16/15</a:t>
+              <a:t>4/21/15</a:t>
             </a:fld>
             <a:endParaRPr lang="en-US"/>
           </a:p>
@@ -1804,7 +1815,7 @@
           <a:p>
             <a:fld id="{0B44415A-ED4C-F049-B1EC-6403452F0569}" type="datetimeFigureOut">
               <a:rPr lang="en-US" smtClean="0"/>
-              <a:t>4/16/15</a:t>
+              <a:t>4/21/15</a:t>
             </a:fld>
             <a:endParaRPr lang="en-US"/>
           </a:p>
@@ -1922,7 +1933,7 @@
           <a:p>
             <a:fld id="{0B44415A-ED4C-F049-B1EC-6403452F0569}" type="datetimeFigureOut">
               <a:rPr lang="en-US" smtClean="0"/>
-              <a:t>4/16/15</a:t>
+              <a:t>4/21/15</a:t>
             </a:fld>
             <a:endParaRPr lang="en-US"/>
           </a:p>
@@ -2017,7 +2028,7 @@
           <a:p>
             <a:fld id="{0B44415A-ED4C-F049-B1EC-6403452F0569}" type="datetimeFigureOut">
               <a:rPr lang="en-US" smtClean="0"/>
-              <a:t>4/16/15</a:t>
+              <a:t>4/21/15</a:t>
             </a:fld>
             <a:endParaRPr lang="en-US"/>
           </a:p>
@@ -2294,7 +2305,7 @@
           <a:p>
             <a:fld id="{0B44415A-ED4C-F049-B1EC-6403452F0569}" type="datetimeFigureOut">
               <a:rPr lang="en-US" smtClean="0"/>
-              <a:t>4/16/15</a:t>
+              <a:t>4/21/15</a:t>
             </a:fld>
             <a:endParaRPr lang="en-US"/>
           </a:p>
@@ -2547,7 +2558,7 @@
           <a:p>
             <a:fld id="{0B44415A-ED4C-F049-B1EC-6403452F0569}" type="datetimeFigureOut">
               <a:rPr lang="en-US" smtClean="0"/>
-              <a:t>4/16/15</a:t>
+              <a:t>4/21/15</a:t>
             </a:fld>
             <a:endParaRPr lang="en-US"/>
           </a:p>
@@ -2760,7 +2771,7 @@
           <a:p>
             <a:fld id="{0B44415A-ED4C-F049-B1EC-6403452F0569}" type="datetimeFigureOut">
               <a:rPr lang="en-US" smtClean="0"/>
-              <a:t>4/16/15</a:t>
+              <a:t>4/21/15</a:t>
             </a:fld>
             <a:endParaRPr lang="en-US"/>
           </a:p>
@@ -15748,7 +15759,15 @@
           <a:p>
             <a:r>
               <a:rPr lang="en-US" b="1" dirty="0" smtClean="0"/>
-              <a:t>Lesson 2: Movement</a:t>
+              <a:t>Lesson </a:t>
+            </a:r>
+            <a:r>
+              <a:rPr lang="en-US" b="1" dirty="0" smtClean="0"/>
+              <a:t>3: </a:t>
+            </a:r>
+            <a:r>
+              <a:rPr lang="en-US" b="1" dirty="0" smtClean="0"/>
+              <a:t>Movement</a:t>
             </a:r>
             <a:endParaRPr lang="en-US" b="1" dirty="0"/>
           </a:p>
@@ -18522,56 +18541,55 @@
           <a:lstStyle/>
           <a:p>
             <a:r>
-              <a:rPr lang="en-US" dirty="0" smtClean="0"/>
-              <a:t>Next Time…</a:t>
-            </a:r>
-            <a:endParaRPr lang="en-US" dirty="0"/>
+              <a:rPr lang="en-US" b="1" dirty="0" smtClean="0"/>
+              <a:t>Lesson </a:t>
+            </a:r>
+            <a:r>
+              <a:rPr lang="en-US" b="1" dirty="0" smtClean="0"/>
+              <a:t>1 in </a:t>
+            </a:r>
+            <a:r>
+              <a:rPr lang="en-US" b="1" dirty="0" err="1" smtClean="0"/>
+              <a:t>Three.js</a:t>
+            </a:r>
+            <a:endParaRPr lang="en-US" b="1" dirty="0"/>
           </a:p>
         </p:txBody>
       </p:sp>
-      <p:sp>
-        <p:nvSpPr>
-          <p:cNvPr id="3" name="Content Placeholder 2"/>
-          <p:cNvSpPr>
-            <a:spLocks noGrp="1"/>
-          </p:cNvSpPr>
-          <p:nvPr>
-            <p:ph idx="1"/>
-          </p:nvPr>
-        </p:nvSpPr>
-        <p:spPr/>
-        <p:txBody>
-          <a:bodyPr/>
-          <a:lstStyle/>
-          <a:p>
-            <a:r>
-              <a:rPr lang="en-US" dirty="0" smtClean="0"/>
-              <a:t>Using </a:t>
-            </a:r>
-            <a:r>
-              <a:rPr lang="en-US" dirty="0" err="1" smtClean="0"/>
-              <a:t>Three.js</a:t>
-            </a:r>
-            <a:r>
-              <a:rPr lang="en-US" dirty="0" smtClean="0"/>
-              <a:t> to make </a:t>
-            </a:r>
-            <a:r>
-              <a:rPr lang="en-US" dirty="0" err="1" smtClean="0"/>
-              <a:t>WebGL</a:t>
-            </a:r>
-            <a:r>
-              <a:rPr lang="en-US" dirty="0" smtClean="0"/>
-              <a:t> more sane.</a:t>
-            </a:r>
-            <a:endParaRPr lang="en-US" dirty="0"/>
-          </a:p>
-        </p:txBody>
-      </p:sp>
+      <p:pic>
+        <p:nvPicPr>
+          <p:cNvPr id="4" name="Picture 3" descr="Screen Shot 2015-04-14 at 4.22.24 PM.png"/>
+          <p:cNvPicPr>
+            <a:picLocks noChangeAspect="1"/>
+          </p:cNvPicPr>
+          <p:nvPr/>
+        </p:nvPicPr>
+        <p:blipFill>
+          <a:blip r:embed="rId2">
+            <a:extLst>
+              <a:ext uri="{28A0092B-C50C-407E-A947-70E740481C1C}">
+                <a14:useLocalDpi xmlns:a14="http://schemas.microsoft.com/office/drawing/2010/main" val="0"/>
+              </a:ext>
+            </a:extLst>
+          </a:blip>
+          <a:stretch>
+            <a:fillRect/>
+          </a:stretch>
+        </p:blipFill>
+        <p:spPr>
+          <a:xfrm>
+            <a:off x="1968883" y="1417639"/>
+            <a:ext cx="5206234" cy="5206234"/>
+          </a:xfrm>
+          <a:prstGeom prst="rect">
+            <a:avLst/>
+          </a:prstGeom>
+        </p:spPr>
+      </p:pic>
     </p:spTree>
     <p:extLst>
       <p:ext uri="{BB962C8B-B14F-4D97-AF65-F5344CB8AC3E}">
-        <p14:creationId xmlns:p14="http://schemas.microsoft.com/office/powerpoint/2010/main" val="212014411"/>
+        <p14:creationId xmlns:p14="http://schemas.microsoft.com/office/powerpoint/2010/main" val="132044852"/>
       </p:ext>
     </p:extLst>
   </p:cSld>
@@ -18705,17 +18723,8 @@
               <a:rPr lang="en-US" dirty="0" smtClean="0">
                 <a:hlinkClick r:id="rId3"/>
               </a:rPr>
-              <a:t>http://localhost:8000</a:t>
-            </a:r>
-            <a:r>
-              <a:rPr lang="en-US" dirty="0" smtClean="0">
-                <a:hlinkClick r:id="rId3"/>
-              </a:rPr>
-              <a:t>/</a:t>
-            </a:r>
-            <a:endParaRPr lang="en-US" dirty="0" smtClean="0">
-              <a:hlinkClick r:id="rId3"/>
-            </a:endParaRPr>
+              <a:t>http://localhost:8000/</a:t>
+            </a:r>
           </a:p>
         </p:txBody>
       </p:sp>
@@ -18740,7 +18749,7 @@
 </file>
 
 <file path=ppt/slides/slide40.xml><?xml version="1.0" encoding="utf-8"?>
-<p:sld xmlns:a="http://schemas.openxmlformats.org/drawingml/2006/main" xmlns:r="http://schemas.openxmlformats.org/officeDocument/2006/relationships" xmlns:p="http://schemas.openxmlformats.org/presentationml/2006/main" show="0">
+<p:sld xmlns:a="http://schemas.openxmlformats.org/drawingml/2006/main" xmlns:r="http://schemas.openxmlformats.org/officeDocument/2006/relationships" xmlns:p="http://schemas.openxmlformats.org/presentationml/2006/main">
   <p:cSld>
     <p:spTree>
       <p:nvGrpSpPr>
@@ -18775,7 +18784,11 @@
           <a:p>
             <a:r>
               <a:rPr lang="en-US" b="1" dirty="0" smtClean="0"/>
-              <a:t>Lesson 1: Triangle and Quad (</a:t>
+              <a:t>Lesson 1: Triangle and Quad </a:t>
+            </a:r>
+            <a:r>
+              <a:rPr lang="en-US" b="1" dirty="0" smtClean="0"/>
+              <a:t>(</a:t>
             </a:r>
             <a:r>
               <a:rPr lang="en-US" b="1" dirty="0" err="1" smtClean="0"/>
@@ -18805,9 +18818,104 @@
           <a:lstStyle/>
           <a:p>
             <a:r>
-              <a:rPr lang="en-US" dirty="0" err="1" smtClean="0"/>
-              <a:t>Three.js</a:t>
-            </a:r>
+              <a:rPr lang="en-US" dirty="0" smtClean="0"/>
+              <a:t>Local Web server links:</a:t>
+            </a:r>
+            <a:r>
+              <a:rPr lang="en-US" dirty="0" smtClean="0">
+                <a:hlinkClick r:id="rId2"/>
+              </a:rPr>
+              <a:t/>
+            </a:r>
+            <a:br>
+              <a:rPr lang="en-US" dirty="0" smtClean="0">
+                <a:hlinkClick r:id="rId2"/>
+              </a:rPr>
+            </a:br>
+            <a:r>
+              <a:rPr lang="en-US" dirty="0" smtClean="0">
+                <a:hlinkClick r:id="rId3"/>
+              </a:rPr>
+              <a:t>Three.js </a:t>
+            </a:r>
+            <a:r>
+              <a:rPr lang="en-US" dirty="0" smtClean="0">
+                <a:hlinkClick r:id="rId3"/>
+              </a:rPr>
+              <a:t>lesson 1</a:t>
+            </a:r>
+            <a:r>
+              <a:rPr lang="en-US" dirty="0" smtClean="0"/>
+              <a:t> (also, </a:t>
+            </a:r>
+            <a:r>
+              <a:rPr lang="en-US" dirty="0" smtClean="0">
+                <a:hlinkClick r:id="rId4" action="ppaction://hlinkfile"/>
+              </a:rPr>
+              <a:t>view source</a:t>
+            </a:r>
+            <a:r>
+              <a:rPr lang="en-US" dirty="0" smtClean="0"/>
+              <a:t>)</a:t>
+            </a:r>
+          </a:p>
+          <a:p>
+            <a:endParaRPr lang="en-US" dirty="0" smtClean="0"/>
+          </a:p>
+          <a:p>
+            <a:r>
+              <a:rPr lang="en-US" dirty="0" smtClean="0"/>
+              <a:t>Web links</a:t>
+            </a:r>
+            <a:r>
+              <a:rPr lang="en-US" dirty="0"/>
+              <a:t>:</a:t>
+            </a:r>
+            <a:r>
+              <a:rPr lang="en-US" dirty="0">
+                <a:hlinkClick r:id="rId5"/>
+              </a:rPr>
+              <a:t/>
+            </a:r>
+            <a:br>
+              <a:rPr lang="en-US" dirty="0">
+                <a:hlinkClick r:id="rId5"/>
+              </a:rPr>
+            </a:br>
+            <a:r>
+              <a:rPr lang="en-US" dirty="0">
+                <a:hlinkClick r:id="rId6"/>
+              </a:rPr>
+              <a:t>T</a:t>
+            </a:r>
+            <a:r>
+              <a:rPr lang="en-US" dirty="0" smtClean="0">
+                <a:hlinkClick r:id="rId6"/>
+              </a:rPr>
+              <a:t>hree.js </a:t>
+            </a:r>
+            <a:r>
+              <a:rPr lang="en-US" dirty="0">
+                <a:hlinkClick r:id="rId6"/>
+              </a:rPr>
+              <a:t>lesson 1</a:t>
+            </a:r>
+            <a:r>
+              <a:rPr lang="en-US" dirty="0"/>
+              <a:t> (also, </a:t>
+            </a:r>
+            <a:r>
+              <a:rPr lang="en-US" dirty="0">
+                <a:hlinkClick r:id="rId7" action="ppaction://hlinkfile"/>
+              </a:rPr>
+              <a:t>view source</a:t>
+            </a:r>
+            <a:r>
+              <a:rPr lang="en-US" dirty="0"/>
+              <a:t>)</a:t>
+            </a:r>
+          </a:p>
+          <a:p>
             <a:endParaRPr lang="en-US" dirty="0"/>
           </a:p>
         </p:txBody>
@@ -18815,21 +18923,13 @@
     </p:spTree>
     <p:extLst>
       <p:ext uri="{BB962C8B-B14F-4D97-AF65-F5344CB8AC3E}">
-        <p14:creationId xmlns:p14="http://schemas.microsoft.com/office/powerpoint/2010/main" val="1647454612"/>
+        <p14:creationId xmlns:p14="http://schemas.microsoft.com/office/powerpoint/2010/main" val="1099025158"/>
       </p:ext>
     </p:extLst>
   </p:cSld>
   <p:clrMapOvr>
     <a:masterClrMapping/>
   </p:clrMapOvr>
-  <mc:AlternateContent xmlns:mc="http://schemas.openxmlformats.org/markup-compatibility/2006">
-    <mc:Choice xmlns:p14="http://schemas.microsoft.com/office/powerpoint/2010/main" Requires="p14">
-      <p:transition spd="slow" p14:dur="2000"/>
-    </mc:Choice>
-    <mc:Fallback>
-      <p:transition xmlns:p14="http://schemas.microsoft.com/office/powerpoint/2010/main" spd="slow"/>
-    </mc:Fallback>
-  </mc:AlternateContent>
   <p:timing>
     <p:tnLst>
       <p:par>
@@ -18841,7 +18941,7 @@
 </file>
 
 <file path=ppt/slides/slide41.xml><?xml version="1.0" encoding="utf-8"?>
-<p:sld xmlns:a="http://schemas.openxmlformats.org/drawingml/2006/main" xmlns:r="http://schemas.openxmlformats.org/officeDocument/2006/relationships" xmlns:p="http://schemas.openxmlformats.org/presentationml/2006/main" show="0">
+<p:sld xmlns:a="http://schemas.openxmlformats.org/drawingml/2006/main" xmlns:r="http://schemas.openxmlformats.org/officeDocument/2006/relationships" xmlns:p="http://schemas.openxmlformats.org/presentationml/2006/main">
   <p:cSld>
     <p:spTree>
       <p:nvGrpSpPr>
@@ -18873,14 +18973,10 @@
           <a:lstStyle/>
           <a:p>
             <a:r>
-              <a:rPr lang="en-US" b="1" dirty="0" err="1" smtClean="0"/>
-              <a:t>Three.js</a:t>
-            </a:r>
-            <a:r>
-              <a:rPr lang="en-US" b="1" dirty="0" smtClean="0"/>
-              <a:t> Mesh Loader</a:t>
-            </a:r>
-            <a:endParaRPr lang="en-US" b="1" dirty="0"/>
+              <a:rPr lang="en-US" dirty="0" smtClean="0"/>
+              <a:t>Lesson 01</a:t>
+            </a:r>
+            <a:endParaRPr lang="en-US" dirty="0"/>
           </a:p>
         </p:txBody>
       </p:sp>
@@ -18894,41 +18990,3938 @@
             <p:ph idx="1"/>
           </p:nvPr>
         </p:nvSpPr>
-        <p:spPr/>
+        <p:spPr>
+          <a:xfrm>
+            <a:off x="457200" y="1600200"/>
+            <a:ext cx="8686800" cy="4525963"/>
+          </a:xfrm>
+        </p:spPr>
         <p:txBody>
-          <a:bodyPr/>
+          <a:bodyPr>
+            <a:normAutofit/>
+          </a:bodyPr>
           <a:lstStyle/>
           <a:p>
             <a:r>
               <a:rPr lang="en-US" dirty="0" smtClean="0"/>
-              <a:t>Simple tutorial </a:t>
+              <a:t>Declare scene and camera, </a:t>
             </a:r>
             <a:r>
               <a:rPr lang="en-US" dirty="0" err="1" smtClean="0"/>
-              <a:t>three.js</a:t>
-            </a:r>
-            <a:endParaRPr lang="en-US" dirty="0"/>
+              <a:t>init</a:t>
+            </a:r>
+            <a:r>
+              <a:rPr lang="en-US" dirty="0" smtClean="0"/>
+              <a:t>, and render.</a:t>
+            </a:r>
+          </a:p>
+          <a:p>
+            <a:endParaRPr lang="en-US" dirty="0" smtClean="0">
+              <a:solidFill>
+                <a:srgbClr val="0000FF"/>
+              </a:solidFill>
+              <a:latin typeface="Lucida Console"/>
+              <a:cs typeface="Lucida Console"/>
+            </a:endParaRPr>
+          </a:p>
+          <a:p>
+            <a:pPr marL="0" indent="0">
+              <a:buNone/>
+            </a:pPr>
+            <a:r>
+              <a:rPr lang="en-US" sz="3000" dirty="0" err="1" smtClean="0">
+                <a:solidFill>
+                  <a:srgbClr val="0000FF"/>
+                </a:solidFill>
+                <a:latin typeface="Lucida Console"/>
+                <a:cs typeface="Lucida Console"/>
+              </a:rPr>
+              <a:t>var</a:t>
+            </a:r>
+            <a:r>
+              <a:rPr lang="en-US" sz="3000" dirty="0" smtClean="0">
+                <a:solidFill>
+                  <a:srgbClr val="0000FF"/>
+                </a:solidFill>
+                <a:latin typeface="Lucida Console"/>
+                <a:cs typeface="Lucida Console"/>
+              </a:rPr>
+              <a:t> </a:t>
+            </a:r>
+            <a:r>
+              <a:rPr lang="en-US" sz="3000" dirty="0">
+                <a:solidFill>
+                  <a:srgbClr val="0000FF"/>
+                </a:solidFill>
+                <a:latin typeface="Lucida Console"/>
+                <a:cs typeface="Lucida Console"/>
+              </a:rPr>
+              <a:t>scene</a:t>
+            </a:r>
+            <a:r>
+              <a:rPr lang="en-US" sz="3000" dirty="0" smtClean="0">
+                <a:solidFill>
+                  <a:srgbClr val="0000FF"/>
+                </a:solidFill>
+                <a:latin typeface="Lucida Console"/>
+                <a:cs typeface="Lucida Console"/>
+              </a:rPr>
+              <a:t>; </a:t>
+            </a:r>
+            <a:r>
+              <a:rPr lang="en-US" sz="3000" dirty="0">
+                <a:solidFill>
+                  <a:srgbClr val="0000FF"/>
+                </a:solidFill>
+                <a:latin typeface="Lucida Console"/>
+                <a:cs typeface="Lucida Console"/>
+              </a:rPr>
+              <a:t>		// Global scene object</a:t>
+            </a:r>
+          </a:p>
+          <a:p>
+            <a:pPr marL="0" indent="0">
+              <a:buNone/>
+            </a:pPr>
+            <a:r>
+              <a:rPr lang="en-US" sz="3000" dirty="0" err="1" smtClean="0">
+                <a:solidFill>
+                  <a:srgbClr val="0000FF"/>
+                </a:solidFill>
+                <a:latin typeface="Lucida Console"/>
+                <a:cs typeface="Lucida Console"/>
+              </a:rPr>
+              <a:t>var</a:t>
+            </a:r>
+            <a:r>
+              <a:rPr lang="en-US" sz="3000" dirty="0" smtClean="0">
+                <a:solidFill>
+                  <a:srgbClr val="0000FF"/>
+                </a:solidFill>
+                <a:latin typeface="Lucida Console"/>
+                <a:cs typeface="Lucida Console"/>
+              </a:rPr>
+              <a:t> </a:t>
+            </a:r>
+            <a:r>
+              <a:rPr lang="en-US" sz="3000" dirty="0">
+                <a:solidFill>
+                  <a:srgbClr val="0000FF"/>
+                </a:solidFill>
+                <a:latin typeface="Lucida Console"/>
+                <a:cs typeface="Lucida Console"/>
+              </a:rPr>
+              <a:t>camera</a:t>
+            </a:r>
+            <a:r>
+              <a:rPr lang="en-US" sz="3000" dirty="0" smtClean="0">
+                <a:solidFill>
+                  <a:srgbClr val="0000FF"/>
+                </a:solidFill>
+                <a:latin typeface="Lucida Console"/>
+                <a:cs typeface="Lucida Console"/>
+              </a:rPr>
+              <a:t>; </a:t>
+            </a:r>
+            <a:r>
+              <a:rPr lang="en-US" sz="3000" dirty="0">
+                <a:solidFill>
+                  <a:srgbClr val="0000FF"/>
+                </a:solidFill>
+                <a:latin typeface="Lucida Console"/>
+                <a:cs typeface="Lucida Console"/>
+              </a:rPr>
+              <a:t>	</a:t>
+            </a:r>
+            <a:r>
+              <a:rPr lang="en-US" sz="3000" dirty="0" smtClean="0">
+                <a:solidFill>
+                  <a:srgbClr val="0000FF"/>
+                </a:solidFill>
+                <a:latin typeface="Lucida Console"/>
+                <a:cs typeface="Lucida Console"/>
+              </a:rPr>
+              <a:t>/</a:t>
+            </a:r>
+            <a:r>
+              <a:rPr lang="en-US" sz="3000" dirty="0">
+                <a:solidFill>
+                  <a:srgbClr val="0000FF"/>
+                </a:solidFill>
+                <a:latin typeface="Lucida Console"/>
+                <a:cs typeface="Lucida Console"/>
+              </a:rPr>
+              <a:t>/ Global camera object</a:t>
+            </a:r>
+          </a:p>
+          <a:p>
+            <a:pPr marL="0" indent="0">
+              <a:buNone/>
+            </a:pPr>
+            <a:endParaRPr lang="en-US" sz="3000" dirty="0">
+              <a:solidFill>
+                <a:srgbClr val="0000FF"/>
+              </a:solidFill>
+              <a:latin typeface="Lucida Console"/>
+              <a:cs typeface="Lucida Console"/>
+            </a:endParaRPr>
+          </a:p>
+          <a:p>
+            <a:pPr marL="0" indent="0">
+              <a:buNone/>
+            </a:pPr>
+            <a:r>
+              <a:rPr lang="en-US" sz="3000" dirty="0" err="1" smtClean="0">
+                <a:solidFill>
+                  <a:srgbClr val="0000FF"/>
+                </a:solidFill>
+                <a:latin typeface="Lucida Console"/>
+                <a:cs typeface="Lucida Console"/>
+              </a:rPr>
+              <a:t>initializeScene</a:t>
+            </a:r>
+            <a:r>
+              <a:rPr lang="en-US" sz="3000" dirty="0">
+                <a:solidFill>
+                  <a:srgbClr val="0000FF"/>
+                </a:solidFill>
+                <a:latin typeface="Lucida Console"/>
+                <a:cs typeface="Lucida Console"/>
+              </a:rPr>
+              <a:t>();</a:t>
+            </a:r>
+          </a:p>
+          <a:p>
+            <a:pPr marL="0" indent="0">
+              <a:buNone/>
+            </a:pPr>
+            <a:r>
+              <a:rPr lang="en-US" sz="3000" dirty="0" err="1" smtClean="0">
+                <a:solidFill>
+                  <a:srgbClr val="0000FF"/>
+                </a:solidFill>
+                <a:latin typeface="Lucida Console"/>
+                <a:cs typeface="Lucida Console"/>
+              </a:rPr>
+              <a:t>renderScene</a:t>
+            </a:r>
+            <a:r>
+              <a:rPr lang="en-US" sz="3000" dirty="0">
+                <a:solidFill>
+                  <a:srgbClr val="0000FF"/>
+                </a:solidFill>
+                <a:latin typeface="Lucida Console"/>
+                <a:cs typeface="Lucida Console"/>
+              </a:rPr>
+              <a:t>();</a:t>
+            </a:r>
+          </a:p>
+          <a:p>
+            <a:pPr marL="0" indent="0">
+              <a:buNone/>
+            </a:pPr>
+            <a:endParaRPr lang="en-US" dirty="0" smtClean="0"/>
           </a:p>
         </p:txBody>
       </p:sp>
     </p:spTree>
     <p:extLst>
       <p:ext uri="{BB962C8B-B14F-4D97-AF65-F5344CB8AC3E}">
-        <p14:creationId xmlns:p14="http://schemas.microsoft.com/office/powerpoint/2010/main" val="2826869002"/>
+        <p14:creationId xmlns:p14="http://schemas.microsoft.com/office/powerpoint/2010/main" val="3506784509"/>
       </p:ext>
     </p:extLst>
   </p:cSld>
   <p:clrMapOvr>
     <a:masterClrMapping/>
   </p:clrMapOvr>
-  <mc:AlternateContent xmlns:mc="http://schemas.openxmlformats.org/markup-compatibility/2006">
-    <mc:Choice xmlns:p14="http://schemas.microsoft.com/office/powerpoint/2010/main" Requires="p14">
-      <p:transition spd="slow" p14:dur="2000"/>
-    </mc:Choice>
-    <mc:Fallback>
-      <p:transition xmlns:p14="http://schemas.microsoft.com/office/powerpoint/2010/main" spd="slow"/>
-    </mc:Fallback>
-  </mc:AlternateContent>
+  <p:timing>
+    <p:tnLst>
+      <p:par>
+        <p:cTn xmlns:p14="http://schemas.microsoft.com/office/powerpoint/2010/main" id="1" dur="indefinite" restart="never" nodeType="tmRoot"/>
+      </p:par>
+    </p:tnLst>
+  </p:timing>
+</p:sld>
+</file>
+
+<file path=ppt/slides/slide42.xml><?xml version="1.0" encoding="utf-8"?>
+<p:sld xmlns:a="http://schemas.openxmlformats.org/drawingml/2006/main" xmlns:r="http://schemas.openxmlformats.org/officeDocument/2006/relationships" xmlns:p="http://schemas.openxmlformats.org/presentationml/2006/main">
+  <p:cSld>
+    <p:spTree>
+      <p:nvGrpSpPr>
+        <p:cNvPr id="1" name=""/>
+        <p:cNvGrpSpPr/>
+        <p:nvPr/>
+      </p:nvGrpSpPr>
+      <p:grpSpPr>
+        <a:xfrm>
+          <a:off x="0" y="0"/>
+          <a:ext cx="0" cy="0"/>
+          <a:chOff x="0" y="0"/>
+          <a:chExt cx="0" cy="0"/>
+        </a:xfrm>
+      </p:grpSpPr>
+      <p:sp>
+        <p:nvSpPr>
+          <p:cNvPr id="2" name="Title 1"/>
+          <p:cNvSpPr>
+            <a:spLocks noGrp="1"/>
+          </p:cNvSpPr>
+          <p:nvPr>
+            <p:ph type="title"/>
+          </p:nvPr>
+        </p:nvSpPr>
+        <p:spPr/>
+        <p:txBody>
+          <a:bodyPr/>
+          <a:lstStyle/>
+          <a:p>
+            <a:r>
+              <a:rPr lang="en-US" dirty="0" smtClean="0"/>
+              <a:t>Lesson 01</a:t>
+            </a:r>
+            <a:endParaRPr lang="en-US" dirty="0"/>
+          </a:p>
+        </p:txBody>
+      </p:sp>
+      <p:sp>
+        <p:nvSpPr>
+          <p:cNvPr id="3" name="Content Placeholder 2"/>
+          <p:cNvSpPr>
+            <a:spLocks noGrp="1"/>
+          </p:cNvSpPr>
+          <p:nvPr>
+            <p:ph idx="1"/>
+          </p:nvPr>
+        </p:nvSpPr>
+        <p:spPr>
+          <a:xfrm>
+            <a:off x="0" y="1417638"/>
+            <a:ext cx="9144000" cy="4525963"/>
+          </a:xfrm>
+        </p:spPr>
+        <p:txBody>
+          <a:bodyPr>
+            <a:normAutofit fontScale="25000" lnSpcReduction="20000"/>
+          </a:bodyPr>
+          <a:lstStyle/>
+          <a:p>
+            <a:r>
+              <a:rPr lang="en-US" sz="12000" dirty="0" smtClean="0"/>
+              <a:t>Set up the renderer.</a:t>
+            </a:r>
+          </a:p>
+          <a:p>
+            <a:endParaRPr lang="en-US" dirty="0" smtClean="0">
+              <a:solidFill>
+                <a:srgbClr val="0000FF"/>
+              </a:solidFill>
+              <a:latin typeface="Lucida Console"/>
+              <a:cs typeface="Lucida Console"/>
+            </a:endParaRPr>
+          </a:p>
+          <a:p>
+            <a:pPr marL="0" indent="0">
+              <a:buNone/>
+            </a:pPr>
+            <a:r>
+              <a:rPr lang="en-US" sz="8000" dirty="0" smtClean="0">
+                <a:solidFill>
+                  <a:srgbClr val="0000FF"/>
+                </a:solidFill>
+                <a:latin typeface="Lucida Console"/>
+                <a:cs typeface="Lucida Console"/>
+              </a:rPr>
+              <a:t>function </a:t>
+            </a:r>
+            <a:r>
+              <a:rPr lang="en-US" sz="8000" dirty="0" err="1">
+                <a:solidFill>
+                  <a:srgbClr val="0000FF"/>
+                </a:solidFill>
+                <a:latin typeface="Lucida Console"/>
+                <a:cs typeface="Lucida Console"/>
+              </a:rPr>
+              <a:t>initializeScene</a:t>
+            </a:r>
+            <a:r>
+              <a:rPr lang="en-US" sz="8000" dirty="0">
+                <a:solidFill>
+                  <a:srgbClr val="0000FF"/>
+                </a:solidFill>
+                <a:latin typeface="Lucida Console"/>
+                <a:cs typeface="Lucida Console"/>
+              </a:rPr>
+              <a:t>(</a:t>
+            </a:r>
+            <a:r>
+              <a:rPr lang="en-US" sz="8000" dirty="0" smtClean="0">
+                <a:solidFill>
+                  <a:srgbClr val="0000FF"/>
+                </a:solidFill>
+                <a:latin typeface="Lucida Console"/>
+                <a:cs typeface="Lucida Console"/>
+              </a:rPr>
+              <a:t>) {</a:t>
+            </a:r>
+            <a:endParaRPr lang="en-US" sz="8000" dirty="0">
+              <a:solidFill>
+                <a:srgbClr val="0000FF"/>
+              </a:solidFill>
+              <a:latin typeface="Lucida Console"/>
+              <a:cs typeface="Lucida Console"/>
+            </a:endParaRPr>
+          </a:p>
+          <a:p>
+            <a:pPr marL="0" indent="0">
+              <a:buNone/>
+            </a:pPr>
+            <a:r>
+              <a:rPr lang="en-US" sz="8000" dirty="0">
+                <a:solidFill>
+                  <a:srgbClr val="0000FF"/>
+                </a:solidFill>
+                <a:latin typeface="Lucida Console"/>
+                <a:cs typeface="Lucida Console"/>
+              </a:rPr>
+              <a:t>    </a:t>
+            </a:r>
+            <a:r>
+              <a:rPr lang="en-US" sz="8000" dirty="0" smtClean="0">
+                <a:solidFill>
+                  <a:srgbClr val="0000FF"/>
+                </a:solidFill>
+                <a:latin typeface="Lucida Console"/>
+                <a:cs typeface="Lucida Console"/>
+              </a:rPr>
+              <a:t>if (</a:t>
+            </a:r>
+            <a:r>
+              <a:rPr lang="en-US" sz="8000" dirty="0" err="1">
+                <a:solidFill>
+                  <a:srgbClr val="0000FF"/>
+                </a:solidFill>
+                <a:latin typeface="Lucida Console"/>
+                <a:cs typeface="Lucida Console"/>
+              </a:rPr>
+              <a:t>Detector.webgl</a:t>
+            </a:r>
+            <a:r>
+              <a:rPr lang="en-US" sz="8000" dirty="0">
+                <a:solidFill>
+                  <a:srgbClr val="0000FF"/>
+                </a:solidFill>
+                <a:latin typeface="Lucida Console"/>
+                <a:cs typeface="Lucida Console"/>
+              </a:rPr>
+              <a:t>){</a:t>
+            </a:r>
+          </a:p>
+          <a:p>
+            <a:pPr marL="0" indent="0">
+              <a:buNone/>
+            </a:pPr>
+            <a:r>
+              <a:rPr lang="en-US" sz="8000" dirty="0">
+                <a:solidFill>
+                  <a:srgbClr val="0000FF"/>
+                </a:solidFill>
+                <a:latin typeface="Lucida Console"/>
+                <a:cs typeface="Lucida Console"/>
+              </a:rPr>
+              <a:t>        renderer = new </a:t>
+            </a:r>
+            <a:r>
+              <a:rPr lang="en-US" sz="8000" dirty="0" smtClean="0">
+                <a:solidFill>
+                  <a:srgbClr val="0000FF"/>
+                </a:solidFill>
+                <a:latin typeface="Lucida Console"/>
+                <a:cs typeface="Lucida Console"/>
+              </a:rPr>
+              <a:t/>
+            </a:r>
+            <a:br>
+              <a:rPr lang="en-US" sz="8000" dirty="0" smtClean="0">
+                <a:solidFill>
+                  <a:srgbClr val="0000FF"/>
+                </a:solidFill>
+                <a:latin typeface="Lucida Console"/>
+                <a:cs typeface="Lucida Console"/>
+              </a:rPr>
+            </a:br>
+            <a:r>
+              <a:rPr lang="en-US" sz="8000" dirty="0" smtClean="0">
+                <a:solidFill>
+                  <a:srgbClr val="0000FF"/>
+                </a:solidFill>
+                <a:latin typeface="Lucida Console"/>
+                <a:cs typeface="Lucida Console"/>
+              </a:rPr>
+              <a:t>          </a:t>
+            </a:r>
+            <a:r>
+              <a:rPr lang="en-US" sz="8000" dirty="0" err="1" smtClean="0">
+                <a:solidFill>
+                  <a:srgbClr val="0000FF"/>
+                </a:solidFill>
+                <a:latin typeface="Lucida Console"/>
+                <a:cs typeface="Lucida Console"/>
+              </a:rPr>
+              <a:t>THREE.WebGLRenderer</a:t>
+            </a:r>
+            <a:r>
+              <a:rPr lang="en-US" sz="8000" dirty="0">
+                <a:solidFill>
+                  <a:srgbClr val="0000FF"/>
+                </a:solidFill>
+                <a:latin typeface="Lucida Console"/>
+                <a:cs typeface="Lucida Console"/>
+              </a:rPr>
+              <a:t>({</a:t>
+            </a:r>
+            <a:r>
+              <a:rPr lang="en-US" sz="8000" dirty="0" err="1">
+                <a:solidFill>
+                  <a:srgbClr val="0000FF"/>
+                </a:solidFill>
+                <a:latin typeface="Lucida Console"/>
+                <a:cs typeface="Lucida Console"/>
+              </a:rPr>
+              <a:t>antialias:true</a:t>
+            </a:r>
+            <a:r>
+              <a:rPr lang="en-US" sz="8000" dirty="0">
+                <a:solidFill>
+                  <a:srgbClr val="0000FF"/>
+                </a:solidFill>
+                <a:latin typeface="Lucida Console"/>
+                <a:cs typeface="Lucida Console"/>
+              </a:rPr>
+              <a:t>})</a:t>
+            </a:r>
+            <a:r>
+              <a:rPr lang="en-US" sz="8000" dirty="0" smtClean="0">
+                <a:solidFill>
+                  <a:srgbClr val="0000FF"/>
+                </a:solidFill>
+                <a:latin typeface="Lucida Console"/>
+                <a:cs typeface="Lucida Console"/>
+              </a:rPr>
+              <a:t>;</a:t>
+            </a:r>
+            <a:endParaRPr lang="en-US" sz="8000" dirty="0">
+              <a:solidFill>
+                <a:srgbClr val="0000FF"/>
+              </a:solidFill>
+              <a:latin typeface="Lucida Console"/>
+              <a:cs typeface="Lucida Console"/>
+            </a:endParaRPr>
+          </a:p>
+          <a:p>
+            <a:pPr marL="0" indent="0">
+              <a:buNone/>
+            </a:pPr>
+            <a:r>
+              <a:rPr lang="en-US" sz="8000" dirty="0">
+                <a:solidFill>
+                  <a:srgbClr val="0000FF"/>
+                </a:solidFill>
+                <a:latin typeface="Lucida Console"/>
+                <a:cs typeface="Lucida Console"/>
+              </a:rPr>
+              <a:t>    } else {</a:t>
+            </a:r>
+          </a:p>
+          <a:p>
+            <a:pPr marL="0" indent="0">
+              <a:buNone/>
+            </a:pPr>
+            <a:r>
+              <a:rPr lang="en-US" sz="8000" dirty="0">
+                <a:solidFill>
+                  <a:srgbClr val="0000FF"/>
+                </a:solidFill>
+                <a:latin typeface="Lucida Console"/>
+                <a:cs typeface="Lucida Console"/>
+              </a:rPr>
+              <a:t>        renderer = new </a:t>
+            </a:r>
+            <a:r>
+              <a:rPr lang="en-US" sz="8000" dirty="0" err="1">
+                <a:solidFill>
+                  <a:srgbClr val="0000FF"/>
+                </a:solidFill>
+                <a:latin typeface="Lucida Console"/>
+                <a:cs typeface="Lucida Console"/>
+              </a:rPr>
+              <a:t>THREE.CanvasRenderer</a:t>
+            </a:r>
+            <a:r>
+              <a:rPr lang="en-US" sz="8000" dirty="0">
+                <a:solidFill>
+                  <a:srgbClr val="0000FF"/>
+                </a:solidFill>
+                <a:latin typeface="Lucida Console"/>
+                <a:cs typeface="Lucida Console"/>
+              </a:rPr>
+              <a:t>()</a:t>
+            </a:r>
+            <a:r>
+              <a:rPr lang="en-US" sz="8000" dirty="0" smtClean="0">
+                <a:solidFill>
+                  <a:srgbClr val="0000FF"/>
+                </a:solidFill>
+                <a:latin typeface="Lucida Console"/>
+                <a:cs typeface="Lucida Console"/>
+              </a:rPr>
+              <a:t>;</a:t>
+            </a:r>
+            <a:endParaRPr lang="en-US" sz="8000" dirty="0">
+              <a:solidFill>
+                <a:srgbClr val="0000FF"/>
+              </a:solidFill>
+              <a:latin typeface="Lucida Console"/>
+              <a:cs typeface="Lucida Console"/>
+            </a:endParaRPr>
+          </a:p>
+          <a:p>
+            <a:pPr marL="0" indent="0">
+              <a:buNone/>
+            </a:pPr>
+            <a:r>
+              <a:rPr lang="en-US" sz="8000" dirty="0">
+                <a:solidFill>
+                  <a:srgbClr val="0000FF"/>
+                </a:solidFill>
+                <a:latin typeface="Lucida Console"/>
+                <a:cs typeface="Lucida Console"/>
+              </a:rPr>
+              <a:t>    }</a:t>
+            </a:r>
+          </a:p>
+          <a:p>
+            <a:pPr marL="0" indent="0">
+              <a:buNone/>
+            </a:pPr>
+            <a:endParaRPr lang="en-US" sz="8000" dirty="0">
+              <a:solidFill>
+                <a:srgbClr val="0000FF"/>
+              </a:solidFill>
+              <a:latin typeface="Lucida Console"/>
+              <a:cs typeface="Lucida Console"/>
+            </a:endParaRPr>
+          </a:p>
+          <a:p>
+            <a:pPr marL="0" indent="0">
+              <a:buNone/>
+            </a:pPr>
+            <a:r>
+              <a:rPr lang="en-US" sz="8000" dirty="0" smtClean="0">
+                <a:solidFill>
+                  <a:srgbClr val="0000FF"/>
+                </a:solidFill>
+                <a:latin typeface="Lucida Console"/>
+                <a:cs typeface="Lucida Console"/>
+              </a:rPr>
+              <a:t>    </a:t>
+            </a:r>
+            <a:r>
+              <a:rPr lang="en-US" sz="8000" dirty="0" err="1" smtClean="0">
+                <a:solidFill>
+                  <a:srgbClr val="0000FF"/>
+                </a:solidFill>
+                <a:latin typeface="Lucida Console"/>
+                <a:cs typeface="Lucida Console"/>
+              </a:rPr>
+              <a:t>renderer.setClearColor</a:t>
+            </a:r>
+            <a:r>
+              <a:rPr lang="en-US" sz="8000" dirty="0">
+                <a:solidFill>
+                  <a:srgbClr val="0000FF"/>
+                </a:solidFill>
+                <a:latin typeface="Lucida Console"/>
+                <a:cs typeface="Lucida Console"/>
+              </a:rPr>
+              <a:t>(0x000000, 1)</a:t>
+            </a:r>
+            <a:r>
+              <a:rPr lang="en-US" sz="8000" dirty="0" smtClean="0">
+                <a:solidFill>
+                  <a:srgbClr val="0000FF"/>
+                </a:solidFill>
+                <a:latin typeface="Lucida Console"/>
+                <a:cs typeface="Lucida Console"/>
+              </a:rPr>
+              <a:t>;  // Opaque black</a:t>
+            </a:r>
+            <a:endParaRPr lang="en-US" sz="8000" dirty="0">
+              <a:solidFill>
+                <a:srgbClr val="0000FF"/>
+              </a:solidFill>
+              <a:latin typeface="Lucida Console"/>
+              <a:cs typeface="Lucida Console"/>
+            </a:endParaRPr>
+          </a:p>
+          <a:p>
+            <a:pPr marL="0" indent="0">
+              <a:buNone/>
+            </a:pPr>
+            <a:endParaRPr lang="en-US" sz="8000" dirty="0">
+              <a:solidFill>
+                <a:srgbClr val="0000FF"/>
+              </a:solidFill>
+              <a:latin typeface="Lucida Console"/>
+              <a:cs typeface="Lucida Console"/>
+            </a:endParaRPr>
+          </a:p>
+          <a:p>
+            <a:pPr marL="0" indent="0">
+              <a:buNone/>
+            </a:pPr>
+            <a:r>
+              <a:rPr lang="en-US" sz="8000" dirty="0" smtClean="0">
+                <a:solidFill>
+                  <a:srgbClr val="0000FF"/>
+                </a:solidFill>
+                <a:latin typeface="Lucida Console"/>
+                <a:cs typeface="Lucida Console"/>
+              </a:rPr>
+              <a:t>    </a:t>
+            </a:r>
+            <a:r>
+              <a:rPr lang="en-US" sz="8000" dirty="0" err="1" smtClean="0">
+                <a:solidFill>
+                  <a:srgbClr val="0000FF"/>
+                </a:solidFill>
+                <a:latin typeface="Lucida Console"/>
+                <a:cs typeface="Lucida Console"/>
+              </a:rPr>
+              <a:t>canvasWidth</a:t>
+            </a:r>
+            <a:r>
+              <a:rPr lang="en-US" sz="8000" dirty="0" smtClean="0">
+                <a:solidFill>
+                  <a:srgbClr val="0000FF"/>
+                </a:solidFill>
+                <a:latin typeface="Lucida Console"/>
+                <a:cs typeface="Lucida Console"/>
+              </a:rPr>
+              <a:t> </a:t>
+            </a:r>
+            <a:r>
+              <a:rPr lang="en-US" sz="8000" dirty="0">
+                <a:solidFill>
+                  <a:srgbClr val="0000FF"/>
+                </a:solidFill>
+                <a:latin typeface="Lucida Console"/>
+                <a:cs typeface="Lucida Console"/>
+              </a:rPr>
+              <a:t>= </a:t>
+            </a:r>
+            <a:r>
+              <a:rPr lang="en-US" sz="8000" dirty="0" err="1">
+                <a:solidFill>
+                  <a:srgbClr val="0000FF"/>
+                </a:solidFill>
+                <a:latin typeface="Lucida Console"/>
+                <a:cs typeface="Lucida Console"/>
+              </a:rPr>
+              <a:t>window.innerWidth</a:t>
+            </a:r>
+            <a:r>
+              <a:rPr lang="en-US" sz="8000" dirty="0" smtClean="0">
+                <a:solidFill>
+                  <a:srgbClr val="0000FF"/>
+                </a:solidFill>
+                <a:latin typeface="Lucida Console"/>
+                <a:cs typeface="Lucida Console"/>
+              </a:rPr>
+              <a:t>;   // Viewport size</a:t>
+            </a:r>
+            <a:endParaRPr lang="en-US" sz="8000" dirty="0">
+              <a:solidFill>
+                <a:srgbClr val="0000FF"/>
+              </a:solidFill>
+              <a:latin typeface="Lucida Console"/>
+              <a:cs typeface="Lucida Console"/>
+            </a:endParaRPr>
+          </a:p>
+          <a:p>
+            <a:pPr marL="0" indent="0">
+              <a:buNone/>
+            </a:pPr>
+            <a:r>
+              <a:rPr lang="en-US" sz="8000" dirty="0">
+                <a:solidFill>
+                  <a:srgbClr val="0000FF"/>
+                </a:solidFill>
+                <a:latin typeface="Lucida Console"/>
+                <a:cs typeface="Lucida Console"/>
+              </a:rPr>
+              <a:t>    </a:t>
+            </a:r>
+            <a:r>
+              <a:rPr lang="en-US" sz="8000" dirty="0" err="1">
+                <a:solidFill>
+                  <a:srgbClr val="0000FF"/>
+                </a:solidFill>
+                <a:latin typeface="Lucida Console"/>
+                <a:cs typeface="Lucida Console"/>
+              </a:rPr>
+              <a:t>canvasHeight</a:t>
+            </a:r>
+            <a:r>
+              <a:rPr lang="en-US" sz="8000" dirty="0">
+                <a:solidFill>
+                  <a:srgbClr val="0000FF"/>
+                </a:solidFill>
+                <a:latin typeface="Lucida Console"/>
+                <a:cs typeface="Lucida Console"/>
+              </a:rPr>
+              <a:t> = </a:t>
+            </a:r>
+            <a:r>
+              <a:rPr lang="en-US" sz="8000" dirty="0" err="1">
+                <a:solidFill>
+                  <a:srgbClr val="0000FF"/>
+                </a:solidFill>
+                <a:latin typeface="Lucida Console"/>
+                <a:cs typeface="Lucida Console"/>
+              </a:rPr>
+              <a:t>window.innerHeight</a:t>
+            </a:r>
+            <a:r>
+              <a:rPr lang="en-US" sz="8000" dirty="0">
+                <a:solidFill>
+                  <a:srgbClr val="0000FF"/>
+                </a:solidFill>
+                <a:latin typeface="Lucida Console"/>
+                <a:cs typeface="Lucida Console"/>
+              </a:rPr>
+              <a:t>;</a:t>
+            </a:r>
+          </a:p>
+          <a:p>
+            <a:pPr marL="0" indent="0">
+              <a:buNone/>
+            </a:pPr>
+            <a:r>
+              <a:rPr lang="en-US" sz="8000" dirty="0" smtClean="0">
+                <a:solidFill>
+                  <a:srgbClr val="0000FF"/>
+                </a:solidFill>
+                <a:latin typeface="Lucida Console"/>
+                <a:cs typeface="Lucida Console"/>
+              </a:rPr>
+              <a:t>    </a:t>
+            </a:r>
+            <a:r>
+              <a:rPr lang="en-US" sz="8000" dirty="0" err="1" smtClean="0">
+                <a:solidFill>
+                  <a:srgbClr val="0000FF"/>
+                </a:solidFill>
+                <a:latin typeface="Lucida Console"/>
+                <a:cs typeface="Lucida Console"/>
+              </a:rPr>
+              <a:t>renderer.setSize</a:t>
+            </a:r>
+            <a:r>
+              <a:rPr lang="en-US" sz="8000" dirty="0">
+                <a:solidFill>
+                  <a:srgbClr val="0000FF"/>
+                </a:solidFill>
+                <a:latin typeface="Lucida Console"/>
+                <a:cs typeface="Lucida Console"/>
+              </a:rPr>
+              <a:t>(</a:t>
+            </a:r>
+            <a:r>
+              <a:rPr lang="en-US" sz="8000" dirty="0" err="1">
+                <a:solidFill>
+                  <a:srgbClr val="0000FF"/>
+                </a:solidFill>
+                <a:latin typeface="Lucida Console"/>
+                <a:cs typeface="Lucida Console"/>
+              </a:rPr>
+              <a:t>canvasWidth</a:t>
+            </a:r>
+            <a:r>
+              <a:rPr lang="en-US" sz="8000" dirty="0">
+                <a:solidFill>
+                  <a:srgbClr val="0000FF"/>
+                </a:solidFill>
+                <a:latin typeface="Lucida Console"/>
+                <a:cs typeface="Lucida Console"/>
+              </a:rPr>
+              <a:t>, </a:t>
+            </a:r>
+            <a:r>
+              <a:rPr lang="en-US" sz="8000" dirty="0" err="1">
+                <a:solidFill>
+                  <a:srgbClr val="0000FF"/>
+                </a:solidFill>
+                <a:latin typeface="Lucida Console"/>
+                <a:cs typeface="Lucida Console"/>
+              </a:rPr>
+              <a:t>canvasHeight</a:t>
+            </a:r>
+            <a:r>
+              <a:rPr lang="en-US" sz="8000" dirty="0">
+                <a:solidFill>
+                  <a:srgbClr val="0000FF"/>
+                </a:solidFill>
+                <a:latin typeface="Lucida Console"/>
+                <a:cs typeface="Lucida Console"/>
+              </a:rPr>
+              <a:t>);</a:t>
+            </a:r>
+          </a:p>
+          <a:p>
+            <a:pPr marL="0" indent="0">
+              <a:buNone/>
+            </a:pPr>
+            <a:endParaRPr lang="en-US" sz="8000" dirty="0">
+              <a:solidFill>
+                <a:srgbClr val="0000FF"/>
+              </a:solidFill>
+              <a:latin typeface="Lucida Console"/>
+              <a:cs typeface="Lucida Console"/>
+            </a:endParaRPr>
+          </a:p>
+          <a:p>
+            <a:pPr marL="0" indent="0">
+              <a:buNone/>
+            </a:pPr>
+            <a:r>
+              <a:rPr lang="en-US" sz="8000" dirty="0" smtClean="0">
+                <a:solidFill>
+                  <a:srgbClr val="0000FF"/>
+                </a:solidFill>
+                <a:latin typeface="Lucida Console"/>
+                <a:cs typeface="Lucida Console"/>
+              </a:rPr>
+              <a:t>    </a:t>
+            </a:r>
+            <a:r>
+              <a:rPr lang="en-US" sz="8000" dirty="0" err="1" smtClean="0">
+                <a:solidFill>
+                  <a:srgbClr val="0000FF"/>
+                </a:solidFill>
+                <a:latin typeface="Lucida Console"/>
+                <a:cs typeface="Lucida Console"/>
+              </a:rPr>
+              <a:t>document.getElementById</a:t>
+            </a:r>
+            <a:r>
+              <a:rPr lang="en-US" sz="8000" dirty="0">
+                <a:solidFill>
+                  <a:srgbClr val="0000FF"/>
+                </a:solidFill>
+                <a:latin typeface="Lucida Console"/>
+                <a:cs typeface="Lucida Console"/>
+              </a:rPr>
+              <a:t>("</a:t>
+            </a:r>
+            <a:r>
+              <a:rPr lang="en-US" sz="8000" dirty="0" err="1">
+                <a:solidFill>
+                  <a:srgbClr val="0000FF"/>
+                </a:solidFill>
+                <a:latin typeface="Lucida Console"/>
+                <a:cs typeface="Lucida Console"/>
+              </a:rPr>
+              <a:t>WebGLCanvas</a:t>
+            </a:r>
+            <a:r>
+              <a:rPr lang="en-US" sz="8000" dirty="0">
+                <a:solidFill>
+                  <a:srgbClr val="0000FF"/>
+                </a:solidFill>
+                <a:latin typeface="Lucida Console"/>
+                <a:cs typeface="Lucida Console"/>
+              </a:rPr>
+              <a:t>")</a:t>
+            </a:r>
+            <a:r>
+              <a:rPr lang="en-US" sz="8000" dirty="0" smtClean="0">
+                <a:solidFill>
+                  <a:srgbClr val="0000FF"/>
+                </a:solidFill>
+                <a:latin typeface="Lucida Console"/>
+                <a:cs typeface="Lucida Console"/>
+              </a:rPr>
+              <a:t>.</a:t>
+            </a:r>
+            <a:br>
+              <a:rPr lang="en-US" sz="8000" dirty="0" smtClean="0">
+                <a:solidFill>
+                  <a:srgbClr val="0000FF"/>
+                </a:solidFill>
+                <a:latin typeface="Lucida Console"/>
+                <a:cs typeface="Lucida Console"/>
+              </a:rPr>
+            </a:br>
+            <a:r>
+              <a:rPr lang="en-US" sz="8000" dirty="0" smtClean="0">
+                <a:solidFill>
+                  <a:srgbClr val="0000FF"/>
+                </a:solidFill>
+                <a:latin typeface="Lucida Console"/>
+                <a:cs typeface="Lucida Console"/>
+              </a:rPr>
+              <a:t>      </a:t>
+            </a:r>
+            <a:r>
+              <a:rPr lang="en-US" sz="8000" dirty="0" err="1" smtClean="0">
+                <a:solidFill>
+                  <a:srgbClr val="0000FF"/>
+                </a:solidFill>
+                <a:latin typeface="Lucida Console"/>
+                <a:cs typeface="Lucida Console"/>
+              </a:rPr>
+              <a:t>appendChild</a:t>
+            </a:r>
+            <a:r>
+              <a:rPr lang="en-US" sz="8000" dirty="0">
+                <a:solidFill>
+                  <a:srgbClr val="0000FF"/>
+                </a:solidFill>
+                <a:latin typeface="Lucida Console"/>
+                <a:cs typeface="Lucida Console"/>
+              </a:rPr>
+              <a:t>(</a:t>
+            </a:r>
+            <a:r>
+              <a:rPr lang="en-US" sz="8000" dirty="0" err="1">
+                <a:solidFill>
+                  <a:srgbClr val="0000FF"/>
+                </a:solidFill>
+                <a:latin typeface="Lucida Console"/>
+                <a:cs typeface="Lucida Console"/>
+              </a:rPr>
+              <a:t>renderer.domElement</a:t>
+            </a:r>
+            <a:r>
+              <a:rPr lang="en-US" sz="8000" dirty="0">
+                <a:solidFill>
+                  <a:srgbClr val="0000FF"/>
+                </a:solidFill>
+                <a:latin typeface="Lucida Console"/>
+                <a:cs typeface="Lucida Console"/>
+              </a:rPr>
+              <a:t>);</a:t>
+            </a:r>
+          </a:p>
+          <a:p>
+            <a:pPr marL="0" indent="0">
+              <a:buNone/>
+            </a:pPr>
+            <a:endParaRPr lang="en-US" sz="3000" dirty="0">
+              <a:solidFill>
+                <a:srgbClr val="0000FF"/>
+              </a:solidFill>
+              <a:latin typeface="Lucida Console"/>
+              <a:cs typeface="Lucida Console"/>
+            </a:endParaRPr>
+          </a:p>
+        </p:txBody>
+      </p:sp>
+    </p:spTree>
+    <p:extLst>
+      <p:ext uri="{BB962C8B-B14F-4D97-AF65-F5344CB8AC3E}">
+        <p14:creationId xmlns:p14="http://schemas.microsoft.com/office/powerpoint/2010/main" val="1817057909"/>
+      </p:ext>
+    </p:extLst>
+  </p:cSld>
+  <p:clrMapOvr>
+    <a:masterClrMapping/>
+  </p:clrMapOvr>
+  <p:timing>
+    <p:tnLst>
+      <p:par>
+        <p:cTn xmlns:p14="http://schemas.microsoft.com/office/powerpoint/2010/main" id="1" dur="indefinite" restart="never" nodeType="tmRoot"/>
+      </p:par>
+    </p:tnLst>
+  </p:timing>
+</p:sld>
+</file>
+
+<file path=ppt/slides/slide43.xml><?xml version="1.0" encoding="utf-8"?>
+<p:sld xmlns:a="http://schemas.openxmlformats.org/drawingml/2006/main" xmlns:r="http://schemas.openxmlformats.org/officeDocument/2006/relationships" xmlns:p="http://schemas.openxmlformats.org/presentationml/2006/main">
+  <p:cSld>
+    <p:spTree>
+      <p:nvGrpSpPr>
+        <p:cNvPr id="1" name=""/>
+        <p:cNvGrpSpPr/>
+        <p:nvPr/>
+      </p:nvGrpSpPr>
+      <p:grpSpPr>
+        <a:xfrm>
+          <a:off x="0" y="0"/>
+          <a:ext cx="0" cy="0"/>
+          <a:chOff x="0" y="0"/>
+          <a:chExt cx="0" cy="0"/>
+        </a:xfrm>
+      </p:grpSpPr>
+      <p:sp>
+        <p:nvSpPr>
+          <p:cNvPr id="2" name="Title 1"/>
+          <p:cNvSpPr>
+            <a:spLocks noGrp="1"/>
+          </p:cNvSpPr>
+          <p:nvPr>
+            <p:ph type="title"/>
+          </p:nvPr>
+        </p:nvSpPr>
+        <p:spPr/>
+        <p:txBody>
+          <a:bodyPr/>
+          <a:lstStyle/>
+          <a:p>
+            <a:r>
+              <a:rPr lang="en-US" dirty="0" smtClean="0"/>
+              <a:t>Lesson 01</a:t>
+            </a:r>
+            <a:endParaRPr lang="en-US" dirty="0"/>
+          </a:p>
+        </p:txBody>
+      </p:sp>
+      <p:sp>
+        <p:nvSpPr>
+          <p:cNvPr id="3" name="Content Placeholder 2"/>
+          <p:cNvSpPr>
+            <a:spLocks noGrp="1"/>
+          </p:cNvSpPr>
+          <p:nvPr>
+            <p:ph idx="1"/>
+          </p:nvPr>
+        </p:nvSpPr>
+        <p:spPr>
+          <a:xfrm>
+            <a:off x="0" y="1417638"/>
+            <a:ext cx="9144000" cy="4525963"/>
+          </a:xfrm>
+        </p:spPr>
+        <p:txBody>
+          <a:bodyPr>
+            <a:normAutofit fontScale="32500" lnSpcReduction="20000"/>
+          </a:bodyPr>
+          <a:lstStyle/>
+          <a:p>
+            <a:r>
+              <a:rPr lang="en-US" sz="12000" dirty="0" smtClean="0"/>
+              <a:t>Create scene and add camera.</a:t>
+            </a:r>
+          </a:p>
+          <a:p>
+            <a:endParaRPr lang="en-US" dirty="0" smtClean="0">
+              <a:solidFill>
+                <a:srgbClr val="0000FF"/>
+              </a:solidFill>
+              <a:latin typeface="Lucida Console"/>
+              <a:cs typeface="Lucida Console"/>
+            </a:endParaRPr>
+          </a:p>
+          <a:p>
+            <a:pPr marL="0" indent="0">
+              <a:buNone/>
+            </a:pPr>
+            <a:r>
+              <a:rPr lang="en-US" sz="8000" dirty="0" smtClean="0">
+                <a:solidFill>
+                  <a:srgbClr val="0000FF"/>
+                </a:solidFill>
+                <a:latin typeface="Lucida Console"/>
+                <a:cs typeface="Lucida Console"/>
+              </a:rPr>
+              <a:t>    scene </a:t>
+            </a:r>
+            <a:r>
+              <a:rPr lang="en-US" sz="8000" dirty="0">
+                <a:solidFill>
+                  <a:srgbClr val="0000FF"/>
+                </a:solidFill>
+                <a:latin typeface="Lucida Console"/>
+                <a:cs typeface="Lucida Console"/>
+              </a:rPr>
+              <a:t>= new </a:t>
+            </a:r>
+            <a:r>
+              <a:rPr lang="en-US" sz="8000" dirty="0" err="1">
+                <a:solidFill>
+                  <a:srgbClr val="0000FF"/>
+                </a:solidFill>
+                <a:latin typeface="Lucida Console"/>
+                <a:cs typeface="Lucida Console"/>
+              </a:rPr>
+              <a:t>THREE.Scene</a:t>
+            </a:r>
+            <a:r>
+              <a:rPr lang="en-US" sz="8000" dirty="0">
+                <a:solidFill>
+                  <a:srgbClr val="0000FF"/>
+                </a:solidFill>
+                <a:latin typeface="Lucida Console"/>
+                <a:cs typeface="Lucida Console"/>
+              </a:rPr>
+              <a:t>();</a:t>
+            </a:r>
+          </a:p>
+          <a:p>
+            <a:pPr marL="0" indent="0">
+              <a:buNone/>
+            </a:pPr>
+            <a:endParaRPr lang="en-US" sz="8000" dirty="0" smtClean="0">
+              <a:solidFill>
+                <a:srgbClr val="0000FF"/>
+              </a:solidFill>
+              <a:latin typeface="Lucida Console"/>
+              <a:cs typeface="Lucida Console"/>
+            </a:endParaRPr>
+          </a:p>
+          <a:p>
+            <a:pPr marL="0" indent="0">
+              <a:buNone/>
+            </a:pPr>
+            <a:r>
+              <a:rPr lang="en-US" sz="8000" dirty="0">
+                <a:solidFill>
+                  <a:srgbClr val="0000FF"/>
+                </a:solidFill>
+                <a:latin typeface="Lucida Console"/>
+                <a:cs typeface="Lucida Console"/>
+              </a:rPr>
+              <a:t> </a:t>
+            </a:r>
+            <a:r>
+              <a:rPr lang="en-US" sz="8000" dirty="0" smtClean="0">
+                <a:solidFill>
+                  <a:srgbClr val="0000FF"/>
+                </a:solidFill>
+                <a:latin typeface="Lucida Console"/>
+                <a:cs typeface="Lucida Console"/>
+              </a:rPr>
+              <a:t>   // Set camera field of view, aspect </a:t>
+            </a:r>
+            <a:br>
+              <a:rPr lang="en-US" sz="8000" dirty="0" smtClean="0">
+                <a:solidFill>
+                  <a:srgbClr val="0000FF"/>
+                </a:solidFill>
+                <a:latin typeface="Lucida Console"/>
+                <a:cs typeface="Lucida Console"/>
+              </a:rPr>
+            </a:br>
+            <a:r>
+              <a:rPr lang="en-US" sz="8000" dirty="0" smtClean="0">
+                <a:solidFill>
+                  <a:srgbClr val="0000FF"/>
+                </a:solidFill>
+                <a:latin typeface="Lucida Console"/>
+                <a:cs typeface="Lucida Console"/>
+              </a:rPr>
+              <a:t>    // ratio, near, far clipping plane</a:t>
+            </a:r>
+            <a:endParaRPr lang="en-US" sz="8000" dirty="0">
+              <a:solidFill>
+                <a:srgbClr val="0000FF"/>
+              </a:solidFill>
+              <a:latin typeface="Lucida Console"/>
+              <a:cs typeface="Lucida Console"/>
+            </a:endParaRPr>
+          </a:p>
+          <a:p>
+            <a:pPr marL="0" indent="0">
+              <a:buNone/>
+            </a:pPr>
+            <a:r>
+              <a:rPr lang="en-US" sz="8000" dirty="0">
+                <a:solidFill>
+                  <a:srgbClr val="0000FF"/>
+                </a:solidFill>
+                <a:latin typeface="Lucida Console"/>
+                <a:cs typeface="Lucida Console"/>
+              </a:rPr>
+              <a:t>    camera = new </a:t>
+            </a:r>
+            <a:r>
+              <a:rPr lang="en-US" sz="8000" dirty="0" err="1">
+                <a:solidFill>
+                  <a:srgbClr val="0000FF"/>
+                </a:solidFill>
+                <a:latin typeface="Lucida Console"/>
+                <a:cs typeface="Lucida Console"/>
+              </a:rPr>
+              <a:t>THREE.PerspectiveCamera</a:t>
+            </a:r>
+            <a:r>
+              <a:rPr lang="en-US" sz="8000" dirty="0" smtClean="0">
+                <a:solidFill>
+                  <a:srgbClr val="0000FF"/>
+                </a:solidFill>
+                <a:latin typeface="Lucida Console"/>
+                <a:cs typeface="Lucida Console"/>
+              </a:rPr>
+              <a:t>(45</a:t>
+            </a:r>
+            <a:r>
+              <a:rPr lang="en-US" sz="8000" dirty="0">
+                <a:solidFill>
+                  <a:srgbClr val="0000FF"/>
+                </a:solidFill>
+                <a:latin typeface="Lucida Console"/>
+                <a:cs typeface="Lucida Console"/>
+              </a:rPr>
+              <a:t>, </a:t>
+            </a:r>
+            <a:r>
+              <a:rPr lang="en-US" sz="8000" dirty="0" smtClean="0">
+                <a:solidFill>
+                  <a:srgbClr val="0000FF"/>
+                </a:solidFill>
+                <a:latin typeface="Lucida Console"/>
+                <a:cs typeface="Lucida Console"/>
+              </a:rPr>
+              <a:t/>
+            </a:r>
+            <a:br>
+              <a:rPr lang="en-US" sz="8000" dirty="0" smtClean="0">
+                <a:solidFill>
+                  <a:srgbClr val="0000FF"/>
+                </a:solidFill>
+                <a:latin typeface="Lucida Console"/>
+                <a:cs typeface="Lucida Console"/>
+              </a:rPr>
+            </a:br>
+            <a:r>
+              <a:rPr lang="en-US" sz="8000" dirty="0" smtClean="0">
+                <a:solidFill>
+                  <a:srgbClr val="0000FF"/>
+                </a:solidFill>
+                <a:latin typeface="Lucida Console"/>
+                <a:cs typeface="Lucida Console"/>
+              </a:rPr>
+              <a:t>       </a:t>
+            </a:r>
+            <a:r>
+              <a:rPr lang="en-US" sz="8000" dirty="0" err="1" smtClean="0">
+                <a:solidFill>
+                  <a:srgbClr val="0000FF"/>
+                </a:solidFill>
+                <a:latin typeface="Lucida Console"/>
+                <a:cs typeface="Lucida Console"/>
+              </a:rPr>
+              <a:t>canvasWidth</a:t>
+            </a:r>
+            <a:r>
+              <a:rPr lang="en-US" sz="8000" dirty="0" smtClean="0">
+                <a:solidFill>
+                  <a:srgbClr val="0000FF"/>
+                </a:solidFill>
+                <a:latin typeface="Lucida Console"/>
+                <a:cs typeface="Lucida Console"/>
+              </a:rPr>
+              <a:t> / </a:t>
+            </a:r>
+            <a:r>
+              <a:rPr lang="en-US" sz="8000" dirty="0" err="1" smtClean="0">
+                <a:solidFill>
+                  <a:srgbClr val="0000FF"/>
+                </a:solidFill>
+                <a:latin typeface="Lucida Console"/>
+                <a:cs typeface="Lucida Console"/>
+              </a:rPr>
+              <a:t>canvasHeight</a:t>
+            </a:r>
+            <a:r>
+              <a:rPr lang="en-US" sz="8000" dirty="0">
+                <a:solidFill>
+                  <a:srgbClr val="0000FF"/>
+                </a:solidFill>
+                <a:latin typeface="Lucida Console"/>
+                <a:cs typeface="Lucida Console"/>
+              </a:rPr>
+              <a:t>, </a:t>
+            </a:r>
+            <a:r>
+              <a:rPr lang="en-US" sz="8000" dirty="0" smtClean="0">
+                <a:solidFill>
+                  <a:srgbClr val="0000FF"/>
+                </a:solidFill>
+                <a:latin typeface="Lucida Console"/>
+                <a:cs typeface="Lucida Console"/>
+              </a:rPr>
+              <a:t>1</a:t>
+            </a:r>
+            <a:r>
+              <a:rPr lang="en-US" sz="8000" dirty="0">
+                <a:solidFill>
+                  <a:srgbClr val="0000FF"/>
+                </a:solidFill>
+                <a:latin typeface="Lucida Console"/>
+                <a:cs typeface="Lucida Console"/>
+              </a:rPr>
+              <a:t>, 100)</a:t>
+            </a:r>
+            <a:r>
+              <a:rPr lang="en-US" sz="8000" dirty="0" smtClean="0">
+                <a:solidFill>
+                  <a:srgbClr val="0000FF"/>
+                </a:solidFill>
+                <a:latin typeface="Lucida Console"/>
+                <a:cs typeface="Lucida Console"/>
+              </a:rPr>
+              <a:t>;</a:t>
+            </a:r>
+            <a:endParaRPr lang="en-US" sz="8000" dirty="0">
+              <a:solidFill>
+                <a:srgbClr val="0000FF"/>
+              </a:solidFill>
+              <a:latin typeface="Lucida Console"/>
+              <a:cs typeface="Lucida Console"/>
+            </a:endParaRPr>
+          </a:p>
+          <a:p>
+            <a:pPr marL="0" indent="0">
+              <a:buNone/>
+            </a:pPr>
+            <a:r>
+              <a:rPr lang="en-US" sz="8000" dirty="0">
+                <a:solidFill>
+                  <a:srgbClr val="0000FF"/>
+                </a:solidFill>
+                <a:latin typeface="Lucida Console"/>
+                <a:cs typeface="Lucida Console"/>
+              </a:rPr>
+              <a:t>    </a:t>
+            </a:r>
+            <a:r>
+              <a:rPr lang="en-US" sz="8000" dirty="0" err="1">
+                <a:solidFill>
+                  <a:srgbClr val="0000FF"/>
+                </a:solidFill>
+                <a:latin typeface="Lucida Console"/>
+                <a:cs typeface="Lucida Console"/>
+              </a:rPr>
+              <a:t>camera.position.set</a:t>
+            </a:r>
+            <a:r>
+              <a:rPr lang="en-US" sz="8000" dirty="0">
+                <a:solidFill>
+                  <a:srgbClr val="0000FF"/>
+                </a:solidFill>
+                <a:latin typeface="Lucida Console"/>
+                <a:cs typeface="Lucida Console"/>
+              </a:rPr>
+              <a:t>(0, 0, 10);</a:t>
+            </a:r>
+          </a:p>
+          <a:p>
+            <a:pPr marL="0" indent="0">
+              <a:buNone/>
+            </a:pPr>
+            <a:r>
+              <a:rPr lang="en-US" sz="8000" dirty="0">
+                <a:solidFill>
+                  <a:srgbClr val="0000FF"/>
+                </a:solidFill>
+                <a:latin typeface="Lucida Console"/>
+                <a:cs typeface="Lucida Console"/>
+              </a:rPr>
+              <a:t>    </a:t>
+            </a:r>
+            <a:r>
+              <a:rPr lang="en-US" sz="8000" dirty="0" err="1">
+                <a:solidFill>
+                  <a:srgbClr val="0000FF"/>
+                </a:solidFill>
+                <a:latin typeface="Lucida Console"/>
+                <a:cs typeface="Lucida Console"/>
+              </a:rPr>
+              <a:t>camera.lookAt</a:t>
+            </a:r>
+            <a:r>
+              <a:rPr lang="en-US" sz="8000" dirty="0">
+                <a:solidFill>
+                  <a:srgbClr val="0000FF"/>
+                </a:solidFill>
+                <a:latin typeface="Lucida Console"/>
+                <a:cs typeface="Lucida Console"/>
+              </a:rPr>
+              <a:t>(</a:t>
+            </a:r>
+            <a:r>
+              <a:rPr lang="en-US" sz="8000" dirty="0" err="1">
+                <a:solidFill>
+                  <a:srgbClr val="0000FF"/>
+                </a:solidFill>
+                <a:latin typeface="Lucida Console"/>
+                <a:cs typeface="Lucida Console"/>
+              </a:rPr>
+              <a:t>scene.position</a:t>
+            </a:r>
+            <a:r>
+              <a:rPr lang="en-US" sz="8000" dirty="0">
+                <a:solidFill>
+                  <a:srgbClr val="0000FF"/>
+                </a:solidFill>
+                <a:latin typeface="Lucida Console"/>
+                <a:cs typeface="Lucida Console"/>
+              </a:rPr>
+              <a:t>);</a:t>
+            </a:r>
+          </a:p>
+          <a:p>
+            <a:pPr marL="0" indent="0">
+              <a:buNone/>
+            </a:pPr>
+            <a:r>
+              <a:rPr lang="en-US" sz="8000" dirty="0">
+                <a:solidFill>
+                  <a:srgbClr val="0000FF"/>
+                </a:solidFill>
+                <a:latin typeface="Lucida Console"/>
+                <a:cs typeface="Lucida Console"/>
+              </a:rPr>
+              <a:t>    </a:t>
+            </a:r>
+            <a:r>
+              <a:rPr lang="en-US" sz="8000" dirty="0" err="1">
+                <a:solidFill>
+                  <a:srgbClr val="0000FF"/>
+                </a:solidFill>
+                <a:latin typeface="Lucida Console"/>
+                <a:cs typeface="Lucida Console"/>
+              </a:rPr>
+              <a:t>scene.add</a:t>
+            </a:r>
+            <a:r>
+              <a:rPr lang="en-US" sz="8000" dirty="0">
+                <a:solidFill>
+                  <a:srgbClr val="0000FF"/>
+                </a:solidFill>
+                <a:latin typeface="Lucida Console"/>
+                <a:cs typeface="Lucida Console"/>
+              </a:rPr>
+              <a:t>(camera);</a:t>
+            </a:r>
+            <a:endParaRPr lang="en-US" sz="3000" dirty="0">
+              <a:solidFill>
+                <a:srgbClr val="0000FF"/>
+              </a:solidFill>
+              <a:latin typeface="Lucida Console"/>
+              <a:cs typeface="Lucida Console"/>
+            </a:endParaRPr>
+          </a:p>
+        </p:txBody>
+      </p:sp>
+    </p:spTree>
+    <p:extLst>
+      <p:ext uri="{BB962C8B-B14F-4D97-AF65-F5344CB8AC3E}">
+        <p14:creationId xmlns:p14="http://schemas.microsoft.com/office/powerpoint/2010/main" val="3271120763"/>
+      </p:ext>
+    </p:extLst>
+  </p:cSld>
+  <p:clrMapOvr>
+    <a:masterClrMapping/>
+  </p:clrMapOvr>
+  <p:timing>
+    <p:tnLst>
+      <p:par>
+        <p:cTn xmlns:p14="http://schemas.microsoft.com/office/powerpoint/2010/main" id="1" dur="indefinite" restart="never" nodeType="tmRoot"/>
+      </p:par>
+    </p:tnLst>
+  </p:timing>
+</p:sld>
+</file>
+
+<file path=ppt/slides/slide44.xml><?xml version="1.0" encoding="utf-8"?>
+<p:sld xmlns:a="http://schemas.openxmlformats.org/drawingml/2006/main" xmlns:r="http://schemas.openxmlformats.org/officeDocument/2006/relationships" xmlns:p="http://schemas.openxmlformats.org/presentationml/2006/main">
+  <p:cSld>
+    <p:spTree>
+      <p:nvGrpSpPr>
+        <p:cNvPr id="1" name=""/>
+        <p:cNvGrpSpPr/>
+        <p:nvPr/>
+      </p:nvGrpSpPr>
+      <p:grpSpPr>
+        <a:xfrm>
+          <a:off x="0" y="0"/>
+          <a:ext cx="0" cy="0"/>
+          <a:chOff x="0" y="0"/>
+          <a:chExt cx="0" cy="0"/>
+        </a:xfrm>
+      </p:grpSpPr>
+      <p:sp>
+        <p:nvSpPr>
+          <p:cNvPr id="2" name="Title 1"/>
+          <p:cNvSpPr>
+            <a:spLocks noGrp="1"/>
+          </p:cNvSpPr>
+          <p:nvPr>
+            <p:ph type="title"/>
+          </p:nvPr>
+        </p:nvSpPr>
+        <p:spPr/>
+        <p:txBody>
+          <a:bodyPr/>
+          <a:lstStyle/>
+          <a:p>
+            <a:r>
+              <a:rPr lang="en-US" dirty="0" smtClean="0"/>
+              <a:t>Lesson 01</a:t>
+            </a:r>
+            <a:endParaRPr lang="en-US" dirty="0"/>
+          </a:p>
+        </p:txBody>
+      </p:sp>
+      <p:sp>
+        <p:nvSpPr>
+          <p:cNvPr id="3" name="Content Placeholder 2"/>
+          <p:cNvSpPr>
+            <a:spLocks noGrp="1"/>
+          </p:cNvSpPr>
+          <p:nvPr>
+            <p:ph idx="1"/>
+          </p:nvPr>
+        </p:nvSpPr>
+        <p:spPr>
+          <a:xfrm>
+            <a:off x="0" y="1417638"/>
+            <a:ext cx="9144000" cy="4525963"/>
+          </a:xfrm>
+        </p:spPr>
+        <p:txBody>
+          <a:bodyPr>
+            <a:normAutofit fontScale="32500" lnSpcReduction="20000"/>
+          </a:bodyPr>
+          <a:lstStyle/>
+          <a:p>
+            <a:r>
+              <a:rPr lang="en-US" sz="12000" dirty="0" smtClean="0"/>
+              <a:t>Create triangle geometry.</a:t>
+            </a:r>
+          </a:p>
+          <a:p>
+            <a:endParaRPr lang="en-US" dirty="0" smtClean="0">
+              <a:solidFill>
+                <a:srgbClr val="0000FF"/>
+              </a:solidFill>
+              <a:latin typeface="Lucida Console"/>
+              <a:cs typeface="Lucida Console"/>
+            </a:endParaRPr>
+          </a:p>
+          <a:p>
+            <a:pPr marL="0" indent="0">
+              <a:buNone/>
+            </a:pPr>
+            <a:r>
+              <a:rPr lang="en-US" sz="8000" dirty="0">
+                <a:solidFill>
+                  <a:srgbClr val="0000FF"/>
+                </a:solidFill>
+                <a:latin typeface="Lucida Console"/>
+                <a:cs typeface="Lucida Console"/>
+              </a:rPr>
+              <a:t> </a:t>
+            </a:r>
+            <a:r>
+              <a:rPr lang="en-US" sz="8000" dirty="0" err="1">
+                <a:solidFill>
+                  <a:srgbClr val="0000FF"/>
+                </a:solidFill>
+                <a:latin typeface="Lucida Console"/>
+                <a:cs typeface="Lucida Console"/>
+              </a:rPr>
+              <a:t>var</a:t>
+            </a:r>
+            <a:r>
+              <a:rPr lang="en-US" sz="8000" dirty="0">
+                <a:solidFill>
+                  <a:srgbClr val="0000FF"/>
+                </a:solidFill>
+                <a:latin typeface="Lucida Console"/>
+                <a:cs typeface="Lucida Console"/>
+              </a:rPr>
+              <a:t> </a:t>
+            </a:r>
+            <a:r>
+              <a:rPr lang="en-US" sz="8000" dirty="0" err="1">
+                <a:solidFill>
+                  <a:srgbClr val="0000FF"/>
+                </a:solidFill>
+                <a:latin typeface="Lucida Console"/>
+                <a:cs typeface="Lucida Console"/>
+              </a:rPr>
+              <a:t>triangleGeometry</a:t>
+            </a:r>
+            <a:r>
+              <a:rPr lang="en-US" sz="8000" dirty="0">
+                <a:solidFill>
+                  <a:srgbClr val="0000FF"/>
+                </a:solidFill>
+                <a:latin typeface="Lucida Console"/>
+                <a:cs typeface="Lucida Console"/>
+              </a:rPr>
+              <a:t> = new </a:t>
+            </a:r>
+            <a:r>
+              <a:rPr lang="en-US" sz="8000" dirty="0" err="1">
+                <a:solidFill>
+                  <a:srgbClr val="0000FF"/>
+                </a:solidFill>
+                <a:latin typeface="Lucida Console"/>
+                <a:cs typeface="Lucida Console"/>
+              </a:rPr>
+              <a:t>THREE.Geometry</a:t>
+            </a:r>
+            <a:r>
+              <a:rPr lang="en-US" sz="8000" dirty="0">
+                <a:solidFill>
+                  <a:srgbClr val="0000FF"/>
+                </a:solidFill>
+                <a:latin typeface="Lucida Console"/>
+                <a:cs typeface="Lucida Console"/>
+              </a:rPr>
+              <a:t>();</a:t>
+            </a:r>
+          </a:p>
+          <a:p>
+            <a:pPr marL="0" indent="0">
+              <a:buNone/>
+            </a:pPr>
+            <a:r>
+              <a:rPr lang="en-US" sz="8000" dirty="0">
+                <a:solidFill>
+                  <a:srgbClr val="0000FF"/>
+                </a:solidFill>
+                <a:latin typeface="Lucida Console"/>
+                <a:cs typeface="Lucida Console"/>
+              </a:rPr>
+              <a:t> </a:t>
+            </a:r>
+            <a:r>
+              <a:rPr lang="en-US" sz="8000" dirty="0" smtClean="0">
+                <a:solidFill>
+                  <a:srgbClr val="0000FF"/>
+                </a:solidFill>
+                <a:latin typeface="Lucida Console"/>
+                <a:cs typeface="Lucida Console"/>
+              </a:rPr>
+              <a:t/>
+            </a:r>
+            <a:br>
+              <a:rPr lang="en-US" sz="8000" dirty="0" smtClean="0">
+                <a:solidFill>
+                  <a:srgbClr val="0000FF"/>
+                </a:solidFill>
+                <a:latin typeface="Lucida Console"/>
+                <a:cs typeface="Lucida Console"/>
+              </a:rPr>
+            </a:br>
+            <a:r>
+              <a:rPr lang="en-US" sz="8000" dirty="0" smtClean="0">
+                <a:solidFill>
+                  <a:srgbClr val="0000FF"/>
+                </a:solidFill>
+                <a:latin typeface="Lucida Console"/>
+                <a:cs typeface="Lucida Console"/>
+              </a:rPr>
+              <a:t> </a:t>
+            </a:r>
+            <a:r>
+              <a:rPr lang="en-US" sz="8000" dirty="0" err="1" smtClean="0">
+                <a:solidFill>
+                  <a:srgbClr val="0000FF"/>
+                </a:solidFill>
+                <a:latin typeface="Lucida Console"/>
+                <a:cs typeface="Lucida Console"/>
+              </a:rPr>
+              <a:t>triangleGeometry.vertices.push</a:t>
+            </a:r>
+            <a:r>
+              <a:rPr lang="en-US" sz="8000" dirty="0">
+                <a:solidFill>
+                  <a:srgbClr val="0000FF"/>
+                </a:solidFill>
+                <a:latin typeface="Lucida Console"/>
+                <a:cs typeface="Lucida Console"/>
+              </a:rPr>
+              <a:t>(new </a:t>
+            </a:r>
+            <a:r>
+              <a:rPr lang="en-US" sz="8000" dirty="0" smtClean="0">
+                <a:solidFill>
+                  <a:srgbClr val="0000FF"/>
+                </a:solidFill>
+                <a:latin typeface="Lucida Console"/>
+                <a:cs typeface="Lucida Console"/>
+              </a:rPr>
+              <a:t/>
+            </a:r>
+            <a:br>
+              <a:rPr lang="en-US" sz="8000" dirty="0" smtClean="0">
+                <a:solidFill>
+                  <a:srgbClr val="0000FF"/>
+                </a:solidFill>
+                <a:latin typeface="Lucida Console"/>
+                <a:cs typeface="Lucida Console"/>
+              </a:rPr>
+            </a:br>
+            <a:r>
+              <a:rPr lang="en-US" sz="8000" dirty="0" smtClean="0">
+                <a:solidFill>
+                  <a:srgbClr val="0000FF"/>
+                </a:solidFill>
+                <a:latin typeface="Lucida Console"/>
+                <a:cs typeface="Lucida Console"/>
+              </a:rPr>
+              <a:t>      THREE.Vector3</a:t>
+            </a:r>
+            <a:r>
+              <a:rPr lang="en-US" sz="8000" dirty="0">
+                <a:solidFill>
+                  <a:srgbClr val="0000FF"/>
+                </a:solidFill>
+                <a:latin typeface="Lucida Console"/>
+                <a:cs typeface="Lucida Console"/>
+              </a:rPr>
+              <a:t>( 0.0,  1.0, 0.0));</a:t>
+            </a:r>
+          </a:p>
+          <a:p>
+            <a:pPr marL="0" indent="0">
+              <a:buNone/>
+            </a:pPr>
+            <a:r>
+              <a:rPr lang="en-US" sz="8000" dirty="0">
+                <a:solidFill>
+                  <a:srgbClr val="0000FF"/>
+                </a:solidFill>
+                <a:latin typeface="Lucida Console"/>
+                <a:cs typeface="Lucida Console"/>
+              </a:rPr>
+              <a:t> </a:t>
+            </a:r>
+            <a:r>
+              <a:rPr lang="en-US" sz="8000" dirty="0" err="1" smtClean="0">
+                <a:solidFill>
+                  <a:srgbClr val="0000FF"/>
+                </a:solidFill>
+                <a:latin typeface="Lucida Console"/>
+                <a:cs typeface="Lucida Console"/>
+              </a:rPr>
+              <a:t>triangleGeometry.vertices.push</a:t>
+            </a:r>
+            <a:r>
+              <a:rPr lang="en-US" sz="8000" dirty="0">
+                <a:solidFill>
+                  <a:srgbClr val="0000FF"/>
+                </a:solidFill>
+                <a:latin typeface="Lucida Console"/>
+                <a:cs typeface="Lucida Console"/>
+              </a:rPr>
+              <a:t>(new </a:t>
+            </a:r>
+            <a:r>
+              <a:rPr lang="en-US" sz="8000" dirty="0" smtClean="0">
+                <a:solidFill>
+                  <a:srgbClr val="0000FF"/>
+                </a:solidFill>
+                <a:latin typeface="Lucida Console"/>
+                <a:cs typeface="Lucida Console"/>
+              </a:rPr>
+              <a:t/>
+            </a:r>
+            <a:br>
+              <a:rPr lang="en-US" sz="8000" dirty="0" smtClean="0">
+                <a:solidFill>
+                  <a:srgbClr val="0000FF"/>
+                </a:solidFill>
+                <a:latin typeface="Lucida Console"/>
+                <a:cs typeface="Lucida Console"/>
+              </a:rPr>
+            </a:br>
+            <a:r>
+              <a:rPr lang="en-US" sz="8000" dirty="0" smtClean="0">
+                <a:solidFill>
+                  <a:srgbClr val="0000FF"/>
+                </a:solidFill>
+                <a:latin typeface="Lucida Console"/>
+                <a:cs typeface="Lucida Console"/>
+              </a:rPr>
+              <a:t>      THREE.Vector3</a:t>
+            </a:r>
+            <a:r>
+              <a:rPr lang="en-US" sz="8000" dirty="0">
+                <a:solidFill>
+                  <a:srgbClr val="0000FF"/>
+                </a:solidFill>
+                <a:latin typeface="Lucida Console"/>
+                <a:cs typeface="Lucida Console"/>
+              </a:rPr>
+              <a:t>(-1.0, -1.0, 0.0));</a:t>
+            </a:r>
+          </a:p>
+          <a:p>
+            <a:pPr marL="0" indent="0">
+              <a:buNone/>
+            </a:pPr>
+            <a:r>
+              <a:rPr lang="en-US" sz="8000" dirty="0">
+                <a:solidFill>
+                  <a:srgbClr val="0000FF"/>
+                </a:solidFill>
+                <a:latin typeface="Lucida Console"/>
+                <a:cs typeface="Lucida Console"/>
+              </a:rPr>
+              <a:t> </a:t>
+            </a:r>
+            <a:r>
+              <a:rPr lang="en-US" sz="8000" dirty="0" err="1" smtClean="0">
+                <a:solidFill>
+                  <a:srgbClr val="0000FF"/>
+                </a:solidFill>
+                <a:latin typeface="Lucida Console"/>
+                <a:cs typeface="Lucida Console"/>
+              </a:rPr>
+              <a:t>triangleGeometry.vertices.push</a:t>
+            </a:r>
+            <a:r>
+              <a:rPr lang="en-US" sz="8000" dirty="0">
+                <a:solidFill>
+                  <a:srgbClr val="0000FF"/>
+                </a:solidFill>
+                <a:latin typeface="Lucida Console"/>
+                <a:cs typeface="Lucida Console"/>
+              </a:rPr>
+              <a:t>(new </a:t>
+            </a:r>
+            <a:r>
+              <a:rPr lang="en-US" sz="8000" dirty="0" smtClean="0">
+                <a:solidFill>
+                  <a:srgbClr val="0000FF"/>
+                </a:solidFill>
+                <a:latin typeface="Lucida Console"/>
+                <a:cs typeface="Lucida Console"/>
+              </a:rPr>
+              <a:t/>
+            </a:r>
+            <a:br>
+              <a:rPr lang="en-US" sz="8000" dirty="0" smtClean="0">
+                <a:solidFill>
+                  <a:srgbClr val="0000FF"/>
+                </a:solidFill>
+                <a:latin typeface="Lucida Console"/>
+                <a:cs typeface="Lucida Console"/>
+              </a:rPr>
+            </a:br>
+            <a:r>
+              <a:rPr lang="en-US" sz="8000" dirty="0" smtClean="0">
+                <a:solidFill>
+                  <a:srgbClr val="0000FF"/>
+                </a:solidFill>
+                <a:latin typeface="Lucida Console"/>
+                <a:cs typeface="Lucida Console"/>
+              </a:rPr>
+              <a:t>      THREE.Vector3</a:t>
+            </a:r>
+            <a:r>
+              <a:rPr lang="en-US" sz="8000" dirty="0">
+                <a:solidFill>
+                  <a:srgbClr val="0000FF"/>
+                </a:solidFill>
+                <a:latin typeface="Lucida Console"/>
+                <a:cs typeface="Lucida Console"/>
+              </a:rPr>
+              <a:t>( 1.0, -1.0, 0.0));</a:t>
+            </a:r>
+          </a:p>
+          <a:p>
+            <a:pPr marL="0" indent="0">
+              <a:buNone/>
+            </a:pPr>
+            <a:r>
+              <a:rPr lang="en-US" sz="8000" dirty="0">
+                <a:solidFill>
+                  <a:srgbClr val="0000FF"/>
+                </a:solidFill>
+                <a:latin typeface="Lucida Console"/>
+                <a:cs typeface="Lucida Console"/>
+              </a:rPr>
+              <a:t> </a:t>
+            </a:r>
+            <a:r>
+              <a:rPr lang="en-US" sz="8000" dirty="0" err="1" smtClean="0">
+                <a:solidFill>
+                  <a:srgbClr val="0000FF"/>
+                </a:solidFill>
+                <a:latin typeface="Lucida Console"/>
+                <a:cs typeface="Lucida Console"/>
+              </a:rPr>
+              <a:t>triangleGeometry.faces.push</a:t>
+            </a:r>
+            <a:r>
+              <a:rPr lang="en-US" sz="8000" dirty="0">
+                <a:solidFill>
+                  <a:srgbClr val="0000FF"/>
+                </a:solidFill>
+                <a:latin typeface="Lucida Console"/>
+                <a:cs typeface="Lucida Console"/>
+              </a:rPr>
+              <a:t>(new </a:t>
+            </a:r>
+            <a:r>
+              <a:rPr lang="en-US" sz="8000" dirty="0" smtClean="0">
+                <a:solidFill>
+                  <a:srgbClr val="0000FF"/>
+                </a:solidFill>
+                <a:latin typeface="Lucida Console"/>
+                <a:cs typeface="Lucida Console"/>
+              </a:rPr>
+              <a:t/>
+            </a:r>
+            <a:br>
+              <a:rPr lang="en-US" sz="8000" dirty="0" smtClean="0">
+                <a:solidFill>
+                  <a:srgbClr val="0000FF"/>
+                </a:solidFill>
+                <a:latin typeface="Lucida Console"/>
+                <a:cs typeface="Lucida Console"/>
+              </a:rPr>
+            </a:br>
+            <a:r>
+              <a:rPr lang="en-US" sz="8000" dirty="0" smtClean="0">
+                <a:solidFill>
+                  <a:srgbClr val="0000FF"/>
+                </a:solidFill>
+                <a:latin typeface="Lucida Console"/>
+                <a:cs typeface="Lucida Console"/>
+              </a:rPr>
+              <a:t>      THREE.Face3</a:t>
+            </a:r>
+            <a:r>
+              <a:rPr lang="en-US" sz="8000" dirty="0">
+                <a:solidFill>
+                  <a:srgbClr val="0000FF"/>
+                </a:solidFill>
+                <a:latin typeface="Lucida Console"/>
+                <a:cs typeface="Lucida Console"/>
+              </a:rPr>
+              <a:t>(0, 1, 2));</a:t>
+            </a:r>
+            <a:endParaRPr lang="en-US" sz="3000" dirty="0">
+              <a:solidFill>
+                <a:srgbClr val="0000FF"/>
+              </a:solidFill>
+              <a:latin typeface="Lucida Console"/>
+              <a:cs typeface="Lucida Console"/>
+            </a:endParaRPr>
+          </a:p>
+        </p:txBody>
+      </p:sp>
+    </p:spTree>
+    <p:extLst>
+      <p:ext uri="{BB962C8B-B14F-4D97-AF65-F5344CB8AC3E}">
+        <p14:creationId xmlns:p14="http://schemas.microsoft.com/office/powerpoint/2010/main" val="2780746788"/>
+      </p:ext>
+    </p:extLst>
+  </p:cSld>
+  <p:clrMapOvr>
+    <a:masterClrMapping/>
+  </p:clrMapOvr>
+  <p:timing>
+    <p:tnLst>
+      <p:par>
+        <p:cTn xmlns:p14="http://schemas.microsoft.com/office/powerpoint/2010/main" id="1" dur="indefinite" restart="never" nodeType="tmRoot"/>
+      </p:par>
+    </p:tnLst>
+  </p:timing>
+</p:sld>
+</file>
+
+<file path=ppt/slides/slide45.xml><?xml version="1.0" encoding="utf-8"?>
+<p:sld xmlns:a="http://schemas.openxmlformats.org/drawingml/2006/main" xmlns:r="http://schemas.openxmlformats.org/officeDocument/2006/relationships" xmlns:p="http://schemas.openxmlformats.org/presentationml/2006/main">
+  <p:cSld>
+    <p:spTree>
+      <p:nvGrpSpPr>
+        <p:cNvPr id="1" name=""/>
+        <p:cNvGrpSpPr/>
+        <p:nvPr/>
+      </p:nvGrpSpPr>
+      <p:grpSpPr>
+        <a:xfrm>
+          <a:off x="0" y="0"/>
+          <a:ext cx="0" cy="0"/>
+          <a:chOff x="0" y="0"/>
+          <a:chExt cx="0" cy="0"/>
+        </a:xfrm>
+      </p:grpSpPr>
+      <p:sp>
+        <p:nvSpPr>
+          <p:cNvPr id="2" name="Title 1"/>
+          <p:cNvSpPr>
+            <a:spLocks noGrp="1"/>
+          </p:cNvSpPr>
+          <p:nvPr>
+            <p:ph type="title"/>
+          </p:nvPr>
+        </p:nvSpPr>
+        <p:spPr/>
+        <p:txBody>
+          <a:bodyPr/>
+          <a:lstStyle/>
+          <a:p>
+            <a:r>
+              <a:rPr lang="en-US" dirty="0" smtClean="0"/>
+              <a:t>Lesson 01</a:t>
+            </a:r>
+            <a:endParaRPr lang="en-US" dirty="0"/>
+          </a:p>
+        </p:txBody>
+      </p:sp>
+      <p:sp>
+        <p:nvSpPr>
+          <p:cNvPr id="3" name="Content Placeholder 2"/>
+          <p:cNvSpPr>
+            <a:spLocks noGrp="1"/>
+          </p:cNvSpPr>
+          <p:nvPr>
+            <p:ph idx="1"/>
+          </p:nvPr>
+        </p:nvSpPr>
+        <p:spPr>
+          <a:xfrm>
+            <a:off x="0" y="1417638"/>
+            <a:ext cx="9144000" cy="4525963"/>
+          </a:xfrm>
+        </p:spPr>
+        <p:txBody>
+          <a:bodyPr>
+            <a:normAutofit fontScale="70000" lnSpcReduction="20000"/>
+          </a:bodyPr>
+          <a:lstStyle/>
+          <a:p>
+            <a:r>
+              <a:rPr lang="en-US" sz="4800" dirty="0" smtClean="0"/>
+              <a:t>Create material.</a:t>
+            </a:r>
+          </a:p>
+          <a:p>
+            <a:endParaRPr lang="en-US" dirty="0" smtClean="0">
+              <a:solidFill>
+                <a:srgbClr val="0000FF"/>
+              </a:solidFill>
+              <a:latin typeface="Lucida Console"/>
+              <a:cs typeface="Lucida Console"/>
+            </a:endParaRPr>
+          </a:p>
+          <a:p>
+            <a:pPr marL="0" indent="0">
+              <a:buNone/>
+            </a:pPr>
+            <a:r>
+              <a:rPr lang="en-US" sz="5100" dirty="0">
+                <a:solidFill>
+                  <a:srgbClr val="0000FF"/>
+                </a:solidFill>
+                <a:latin typeface="Lucida Console"/>
+                <a:cs typeface="Lucida Console"/>
+              </a:rPr>
+              <a:t> </a:t>
+            </a:r>
+            <a:r>
+              <a:rPr lang="en-US" sz="4000" dirty="0" err="1">
+                <a:solidFill>
+                  <a:srgbClr val="0000FF"/>
+                </a:solidFill>
+                <a:latin typeface="Lucida Console"/>
+                <a:cs typeface="Lucida Console"/>
+              </a:rPr>
+              <a:t>var</a:t>
+            </a:r>
+            <a:r>
+              <a:rPr lang="en-US" sz="4000" dirty="0">
+                <a:solidFill>
+                  <a:srgbClr val="0000FF"/>
+                </a:solidFill>
+                <a:latin typeface="Lucida Console"/>
+                <a:cs typeface="Lucida Console"/>
+              </a:rPr>
+              <a:t> </a:t>
+            </a:r>
+            <a:r>
+              <a:rPr lang="en-US" sz="4000" dirty="0" err="1">
+                <a:solidFill>
+                  <a:srgbClr val="0000FF"/>
+                </a:solidFill>
+                <a:latin typeface="Lucida Console"/>
+                <a:cs typeface="Lucida Console"/>
+              </a:rPr>
+              <a:t>triangleMaterial</a:t>
+            </a:r>
+            <a:r>
+              <a:rPr lang="en-US" sz="4000" dirty="0">
+                <a:solidFill>
+                  <a:srgbClr val="0000FF"/>
+                </a:solidFill>
+                <a:latin typeface="Lucida Console"/>
+                <a:cs typeface="Lucida Console"/>
+              </a:rPr>
+              <a:t> = new </a:t>
+            </a:r>
+            <a:r>
+              <a:rPr lang="en-US" sz="4000" dirty="0" smtClean="0">
+                <a:solidFill>
+                  <a:srgbClr val="0000FF"/>
+                </a:solidFill>
+                <a:latin typeface="Lucida Console"/>
+                <a:cs typeface="Lucida Console"/>
+              </a:rPr>
+              <a:t/>
+            </a:r>
+            <a:br>
+              <a:rPr lang="en-US" sz="4000" dirty="0" smtClean="0">
+                <a:solidFill>
+                  <a:srgbClr val="0000FF"/>
+                </a:solidFill>
+                <a:latin typeface="Lucida Console"/>
+                <a:cs typeface="Lucida Console"/>
+              </a:rPr>
+            </a:br>
+            <a:r>
+              <a:rPr lang="en-US" sz="4000" dirty="0" smtClean="0">
+                <a:solidFill>
+                  <a:srgbClr val="0000FF"/>
+                </a:solidFill>
+                <a:latin typeface="Lucida Console"/>
+                <a:cs typeface="Lucida Console"/>
+              </a:rPr>
+              <a:t>    </a:t>
+            </a:r>
+            <a:r>
+              <a:rPr lang="en-US" sz="4000" dirty="0" err="1" smtClean="0">
+                <a:solidFill>
+                  <a:srgbClr val="0000FF"/>
+                </a:solidFill>
+                <a:latin typeface="Lucida Console"/>
+                <a:cs typeface="Lucida Console"/>
+              </a:rPr>
+              <a:t>THREE.MeshBasicMaterial</a:t>
+            </a:r>
+            <a:r>
+              <a:rPr lang="en-US" sz="4000" dirty="0">
+                <a:solidFill>
+                  <a:srgbClr val="0000FF"/>
+                </a:solidFill>
+                <a:latin typeface="Lucida Console"/>
+                <a:cs typeface="Lucida Console"/>
+              </a:rPr>
+              <a:t>({</a:t>
+            </a:r>
+          </a:p>
+          <a:p>
+            <a:pPr marL="0" indent="0">
+              <a:buNone/>
+            </a:pPr>
+            <a:r>
+              <a:rPr lang="en-US" sz="4000" dirty="0">
+                <a:solidFill>
+                  <a:srgbClr val="0000FF"/>
+                </a:solidFill>
+                <a:latin typeface="Lucida Console"/>
+                <a:cs typeface="Lucida Console"/>
+              </a:rPr>
+              <a:t>        color:0xFFFFFF,</a:t>
+            </a:r>
+          </a:p>
+          <a:p>
+            <a:pPr marL="0" indent="0">
+              <a:buNone/>
+            </a:pPr>
+            <a:r>
+              <a:rPr lang="en-US" sz="4000" dirty="0" smtClean="0">
+                <a:solidFill>
+                  <a:srgbClr val="0000FF"/>
+                </a:solidFill>
+                <a:latin typeface="Lucida Console"/>
+                <a:cs typeface="Lucida Console"/>
+              </a:rPr>
+              <a:t>    </a:t>
+            </a:r>
+            <a:r>
+              <a:rPr lang="en-US" sz="4000" dirty="0" err="1" smtClean="0">
+                <a:solidFill>
+                  <a:srgbClr val="0000FF"/>
+                </a:solidFill>
+                <a:latin typeface="Lucida Console"/>
+                <a:cs typeface="Lucida Console"/>
+              </a:rPr>
+              <a:t>side:THREE.DoubleSide</a:t>
+            </a:r>
+            <a:r>
+              <a:rPr lang="en-US" sz="4000" dirty="0">
+                <a:solidFill>
+                  <a:srgbClr val="0000FF"/>
+                </a:solidFill>
+                <a:latin typeface="Lucida Console"/>
+                <a:cs typeface="Lucida Console"/>
+              </a:rPr>
+              <a:t/>
+            </a:r>
+            <a:br>
+              <a:rPr lang="en-US" sz="4000" dirty="0">
+                <a:solidFill>
+                  <a:srgbClr val="0000FF"/>
+                </a:solidFill>
+                <a:latin typeface="Lucida Console"/>
+                <a:cs typeface="Lucida Console"/>
+              </a:rPr>
+            </a:br>
+            <a:r>
+              <a:rPr lang="en-US" sz="4000" dirty="0" smtClean="0">
+                <a:solidFill>
+                  <a:srgbClr val="0000FF"/>
+                </a:solidFill>
+                <a:latin typeface="Lucida Console"/>
+                <a:cs typeface="Lucida Console"/>
+              </a:rPr>
+              <a:t>    /</a:t>
+            </a:r>
+            <a:r>
+              <a:rPr lang="en-US" sz="4000" dirty="0">
+                <a:solidFill>
+                  <a:srgbClr val="0000FF"/>
+                </a:solidFill>
+                <a:latin typeface="Lucida Console"/>
+                <a:cs typeface="Lucida Console"/>
+              </a:rPr>
+              <a:t>/ Render </a:t>
+            </a:r>
+            <a:r>
+              <a:rPr lang="en-US" sz="4000" dirty="0" smtClean="0">
+                <a:solidFill>
+                  <a:srgbClr val="0000FF"/>
+                </a:solidFill>
+                <a:latin typeface="Lucida Console"/>
+                <a:cs typeface="Lucida Console"/>
+              </a:rPr>
+              <a:t>front </a:t>
+            </a:r>
+            <a:r>
+              <a:rPr lang="en-US" sz="4000" dirty="0">
+                <a:solidFill>
+                  <a:srgbClr val="0000FF"/>
+                </a:solidFill>
+                <a:latin typeface="Lucida Console"/>
+                <a:cs typeface="Lucida Console"/>
+              </a:rPr>
+              <a:t>and back-facing </a:t>
+            </a:r>
+            <a:r>
+              <a:rPr lang="en-US" sz="4000" dirty="0" smtClean="0">
+                <a:solidFill>
+                  <a:srgbClr val="0000FF"/>
+                </a:solidFill>
+                <a:latin typeface="Lucida Console"/>
+                <a:cs typeface="Lucida Console"/>
+              </a:rPr>
+              <a:t>polys</a:t>
+            </a:r>
+            <a:endParaRPr lang="en-US" sz="4000" dirty="0">
+              <a:solidFill>
+                <a:srgbClr val="0000FF"/>
+              </a:solidFill>
+              <a:latin typeface="Lucida Console"/>
+              <a:cs typeface="Lucida Console"/>
+            </a:endParaRPr>
+          </a:p>
+          <a:p>
+            <a:pPr marL="0" indent="0">
+              <a:buNone/>
+            </a:pPr>
+            <a:r>
+              <a:rPr lang="en-US" sz="4000" dirty="0">
+                <a:solidFill>
+                  <a:srgbClr val="0000FF"/>
+                </a:solidFill>
+                <a:latin typeface="Lucida Console"/>
+                <a:cs typeface="Lucida Console"/>
+              </a:rPr>
+              <a:t> </a:t>
+            </a:r>
+            <a:r>
+              <a:rPr lang="en-US" sz="4000" dirty="0" smtClean="0">
+                <a:solidFill>
+                  <a:srgbClr val="0000FF"/>
+                </a:solidFill>
+                <a:latin typeface="Lucida Console"/>
+                <a:cs typeface="Lucida Console"/>
+              </a:rPr>
+              <a:t>}</a:t>
+            </a:r>
+            <a:r>
+              <a:rPr lang="en-US" sz="4000" dirty="0">
+                <a:solidFill>
+                  <a:srgbClr val="0000FF"/>
+                </a:solidFill>
+                <a:latin typeface="Lucida Console"/>
+                <a:cs typeface="Lucida Console"/>
+              </a:rPr>
+              <a:t>);</a:t>
+            </a:r>
+          </a:p>
+        </p:txBody>
+      </p:sp>
+    </p:spTree>
+    <p:extLst>
+      <p:ext uri="{BB962C8B-B14F-4D97-AF65-F5344CB8AC3E}">
+        <p14:creationId xmlns:p14="http://schemas.microsoft.com/office/powerpoint/2010/main" val="1333771411"/>
+      </p:ext>
+    </p:extLst>
+  </p:cSld>
+  <p:clrMapOvr>
+    <a:masterClrMapping/>
+  </p:clrMapOvr>
+  <p:timing>
+    <p:tnLst>
+      <p:par>
+        <p:cTn xmlns:p14="http://schemas.microsoft.com/office/powerpoint/2010/main" id="1" dur="indefinite" restart="never" nodeType="tmRoot"/>
+      </p:par>
+    </p:tnLst>
+  </p:timing>
+</p:sld>
+</file>
+
+<file path=ppt/slides/slide46.xml><?xml version="1.0" encoding="utf-8"?>
+<p:sld xmlns:a="http://schemas.openxmlformats.org/drawingml/2006/main" xmlns:r="http://schemas.openxmlformats.org/officeDocument/2006/relationships" xmlns:p="http://schemas.openxmlformats.org/presentationml/2006/main">
+  <p:cSld>
+    <p:spTree>
+      <p:nvGrpSpPr>
+        <p:cNvPr id="1" name=""/>
+        <p:cNvGrpSpPr/>
+        <p:nvPr/>
+      </p:nvGrpSpPr>
+      <p:grpSpPr>
+        <a:xfrm>
+          <a:off x="0" y="0"/>
+          <a:ext cx="0" cy="0"/>
+          <a:chOff x="0" y="0"/>
+          <a:chExt cx="0" cy="0"/>
+        </a:xfrm>
+      </p:grpSpPr>
+      <p:sp>
+        <p:nvSpPr>
+          <p:cNvPr id="2" name="Title 1"/>
+          <p:cNvSpPr>
+            <a:spLocks noGrp="1"/>
+          </p:cNvSpPr>
+          <p:nvPr>
+            <p:ph type="title"/>
+          </p:nvPr>
+        </p:nvSpPr>
+        <p:spPr/>
+        <p:txBody>
+          <a:bodyPr/>
+          <a:lstStyle/>
+          <a:p>
+            <a:r>
+              <a:rPr lang="en-US" dirty="0" smtClean="0"/>
+              <a:t>Lesson 01</a:t>
+            </a:r>
+            <a:endParaRPr lang="en-US" dirty="0"/>
+          </a:p>
+        </p:txBody>
+      </p:sp>
+      <p:sp>
+        <p:nvSpPr>
+          <p:cNvPr id="3" name="Content Placeholder 2"/>
+          <p:cNvSpPr>
+            <a:spLocks noGrp="1"/>
+          </p:cNvSpPr>
+          <p:nvPr>
+            <p:ph idx="1"/>
+          </p:nvPr>
+        </p:nvSpPr>
+        <p:spPr>
+          <a:xfrm>
+            <a:off x="0" y="1417638"/>
+            <a:ext cx="9144000" cy="4525963"/>
+          </a:xfrm>
+        </p:spPr>
+        <p:txBody>
+          <a:bodyPr>
+            <a:normAutofit fontScale="70000" lnSpcReduction="20000"/>
+          </a:bodyPr>
+          <a:lstStyle/>
+          <a:p>
+            <a:r>
+              <a:rPr lang="en-US" sz="4800" dirty="0" smtClean="0"/>
+              <a:t>Combine geometry and material into mesh.</a:t>
+            </a:r>
+          </a:p>
+          <a:p>
+            <a:endParaRPr lang="en-US" dirty="0" smtClean="0">
+              <a:solidFill>
+                <a:srgbClr val="0000FF"/>
+              </a:solidFill>
+              <a:latin typeface="Lucida Console"/>
+              <a:cs typeface="Lucida Console"/>
+            </a:endParaRPr>
+          </a:p>
+          <a:p>
+            <a:pPr marL="0" indent="0">
+              <a:buNone/>
+            </a:pPr>
+            <a:r>
+              <a:rPr lang="en-US" sz="3900" dirty="0" err="1" smtClean="0">
+                <a:solidFill>
+                  <a:srgbClr val="0000FF"/>
+                </a:solidFill>
+                <a:latin typeface="Lucida Console"/>
+                <a:cs typeface="Lucida Console"/>
+              </a:rPr>
+              <a:t>var</a:t>
+            </a:r>
+            <a:r>
+              <a:rPr lang="en-US" sz="3900" dirty="0" smtClean="0">
+                <a:solidFill>
+                  <a:srgbClr val="0000FF"/>
+                </a:solidFill>
+                <a:latin typeface="Lucida Console"/>
+                <a:cs typeface="Lucida Console"/>
+              </a:rPr>
+              <a:t> </a:t>
+            </a:r>
+            <a:r>
+              <a:rPr lang="en-US" sz="3900" dirty="0" err="1">
+                <a:solidFill>
+                  <a:srgbClr val="0000FF"/>
+                </a:solidFill>
+                <a:latin typeface="Lucida Console"/>
+                <a:cs typeface="Lucida Console"/>
+              </a:rPr>
+              <a:t>triangleMesh</a:t>
+            </a:r>
+            <a:r>
+              <a:rPr lang="en-US" sz="3900" dirty="0">
+                <a:solidFill>
+                  <a:srgbClr val="0000FF"/>
+                </a:solidFill>
+                <a:latin typeface="Lucida Console"/>
+                <a:cs typeface="Lucida Console"/>
+              </a:rPr>
+              <a:t> = new </a:t>
+            </a:r>
+            <a:r>
+              <a:rPr lang="en-US" sz="3900" dirty="0" smtClean="0">
+                <a:solidFill>
+                  <a:srgbClr val="0000FF"/>
+                </a:solidFill>
+                <a:latin typeface="Lucida Console"/>
+                <a:cs typeface="Lucida Console"/>
+              </a:rPr>
+              <a:t/>
+            </a:r>
+            <a:br>
+              <a:rPr lang="en-US" sz="3900" dirty="0" smtClean="0">
+                <a:solidFill>
+                  <a:srgbClr val="0000FF"/>
+                </a:solidFill>
+                <a:latin typeface="Lucida Console"/>
+                <a:cs typeface="Lucida Console"/>
+              </a:rPr>
+            </a:br>
+            <a:r>
+              <a:rPr lang="en-US" sz="3900" dirty="0" smtClean="0">
+                <a:solidFill>
+                  <a:srgbClr val="0000FF"/>
+                </a:solidFill>
+                <a:latin typeface="Lucida Console"/>
+                <a:cs typeface="Lucida Console"/>
+              </a:rPr>
+              <a:t>    </a:t>
+            </a:r>
+            <a:r>
+              <a:rPr lang="en-US" sz="3900" dirty="0" err="1" smtClean="0">
+                <a:solidFill>
+                  <a:srgbClr val="0000FF"/>
+                </a:solidFill>
+                <a:latin typeface="Lucida Console"/>
+                <a:cs typeface="Lucida Console"/>
+              </a:rPr>
+              <a:t>THREE.Mesh</a:t>
+            </a:r>
+            <a:r>
+              <a:rPr lang="en-US" sz="3900" dirty="0">
+                <a:solidFill>
+                  <a:srgbClr val="0000FF"/>
+                </a:solidFill>
+                <a:latin typeface="Lucida Console"/>
+                <a:cs typeface="Lucida Console"/>
+              </a:rPr>
+              <a:t>(</a:t>
+            </a:r>
+            <a:r>
+              <a:rPr lang="en-US" sz="3900" dirty="0" err="1">
+                <a:solidFill>
+                  <a:srgbClr val="0000FF"/>
+                </a:solidFill>
+                <a:latin typeface="Lucida Console"/>
+                <a:cs typeface="Lucida Console"/>
+              </a:rPr>
+              <a:t>triangleGeometry</a:t>
+            </a:r>
+            <a:r>
+              <a:rPr lang="en-US" sz="3900" dirty="0">
+                <a:solidFill>
+                  <a:srgbClr val="0000FF"/>
+                </a:solidFill>
+                <a:latin typeface="Lucida Console"/>
+                <a:cs typeface="Lucida Console"/>
+              </a:rPr>
+              <a:t>, </a:t>
+            </a:r>
+            <a:r>
+              <a:rPr lang="en-US" sz="3900" dirty="0" smtClean="0">
+                <a:solidFill>
+                  <a:srgbClr val="0000FF"/>
+                </a:solidFill>
+                <a:latin typeface="Lucida Console"/>
+                <a:cs typeface="Lucida Console"/>
+              </a:rPr>
+              <a:t/>
+            </a:r>
+            <a:br>
+              <a:rPr lang="en-US" sz="3900" dirty="0" smtClean="0">
+                <a:solidFill>
+                  <a:srgbClr val="0000FF"/>
+                </a:solidFill>
+                <a:latin typeface="Lucida Console"/>
+                <a:cs typeface="Lucida Console"/>
+              </a:rPr>
+            </a:br>
+            <a:r>
+              <a:rPr lang="en-US" sz="3900" dirty="0" smtClean="0">
+                <a:solidFill>
+                  <a:srgbClr val="0000FF"/>
+                </a:solidFill>
+                <a:latin typeface="Lucida Console"/>
+                <a:cs typeface="Lucida Console"/>
+              </a:rPr>
+              <a:t>               </a:t>
+            </a:r>
+            <a:r>
+              <a:rPr lang="en-US" sz="3900" dirty="0" err="1" smtClean="0">
+                <a:solidFill>
+                  <a:srgbClr val="0000FF"/>
+                </a:solidFill>
+                <a:latin typeface="Lucida Console"/>
+                <a:cs typeface="Lucida Console"/>
+              </a:rPr>
+              <a:t>triangleMaterial</a:t>
+            </a:r>
+            <a:r>
+              <a:rPr lang="en-US" sz="3900" dirty="0">
+                <a:solidFill>
+                  <a:srgbClr val="0000FF"/>
+                </a:solidFill>
+                <a:latin typeface="Lucida Console"/>
+                <a:cs typeface="Lucida Console"/>
+              </a:rPr>
+              <a:t>);</a:t>
+            </a:r>
+          </a:p>
+          <a:p>
+            <a:pPr marL="0" indent="0">
+              <a:buNone/>
+            </a:pPr>
+            <a:r>
+              <a:rPr lang="en-US" sz="3900" dirty="0" err="1" smtClean="0">
+                <a:solidFill>
+                  <a:srgbClr val="0000FF"/>
+                </a:solidFill>
+                <a:latin typeface="Lucida Console"/>
+                <a:cs typeface="Lucida Console"/>
+              </a:rPr>
+              <a:t>triangleMesh.position.set</a:t>
+            </a:r>
+            <a:r>
+              <a:rPr lang="en-US" sz="3900" dirty="0">
+                <a:solidFill>
+                  <a:srgbClr val="0000FF"/>
+                </a:solidFill>
+                <a:latin typeface="Lucida Console"/>
+                <a:cs typeface="Lucida Console"/>
+              </a:rPr>
+              <a:t>(-1.5, </a:t>
+            </a:r>
+            <a:r>
+              <a:rPr lang="en-US" sz="3900" dirty="0" smtClean="0">
+                <a:solidFill>
+                  <a:srgbClr val="0000FF"/>
+                </a:solidFill>
+                <a:latin typeface="Lucida Console"/>
+                <a:cs typeface="Lucida Console"/>
+              </a:rPr>
+              <a:t>0.0, 4.0</a:t>
+            </a:r>
+            <a:r>
+              <a:rPr lang="en-US" sz="3900" dirty="0">
+                <a:solidFill>
+                  <a:srgbClr val="0000FF"/>
+                </a:solidFill>
+                <a:latin typeface="Lucida Console"/>
+                <a:cs typeface="Lucida Console"/>
+              </a:rPr>
+              <a:t>);</a:t>
+            </a:r>
+          </a:p>
+          <a:p>
+            <a:pPr marL="0" indent="0">
+              <a:buNone/>
+            </a:pPr>
+            <a:r>
+              <a:rPr lang="en-US" sz="3900" dirty="0" err="1" smtClean="0">
+                <a:solidFill>
+                  <a:srgbClr val="0000FF"/>
+                </a:solidFill>
+                <a:latin typeface="Lucida Console"/>
+                <a:cs typeface="Lucida Console"/>
+              </a:rPr>
+              <a:t>scene.add</a:t>
+            </a:r>
+            <a:r>
+              <a:rPr lang="en-US" sz="3900" dirty="0">
+                <a:solidFill>
+                  <a:srgbClr val="0000FF"/>
+                </a:solidFill>
+                <a:latin typeface="Lucida Console"/>
+                <a:cs typeface="Lucida Console"/>
+              </a:rPr>
+              <a:t>(</a:t>
+            </a:r>
+            <a:r>
+              <a:rPr lang="en-US" sz="3900" dirty="0" err="1">
+                <a:solidFill>
+                  <a:srgbClr val="0000FF"/>
+                </a:solidFill>
+                <a:latin typeface="Lucida Console"/>
+                <a:cs typeface="Lucida Console"/>
+              </a:rPr>
+              <a:t>triangleMesh</a:t>
+            </a:r>
+            <a:r>
+              <a:rPr lang="en-US" sz="3900" dirty="0">
+                <a:solidFill>
+                  <a:srgbClr val="0000FF"/>
+                </a:solidFill>
+                <a:latin typeface="Lucida Console"/>
+                <a:cs typeface="Lucida Console"/>
+              </a:rPr>
+              <a:t>);</a:t>
+            </a:r>
+          </a:p>
+        </p:txBody>
+      </p:sp>
+    </p:spTree>
+    <p:extLst>
+      <p:ext uri="{BB962C8B-B14F-4D97-AF65-F5344CB8AC3E}">
+        <p14:creationId xmlns:p14="http://schemas.microsoft.com/office/powerpoint/2010/main" val="1396490400"/>
+      </p:ext>
+    </p:extLst>
+  </p:cSld>
+  <p:clrMapOvr>
+    <a:masterClrMapping/>
+  </p:clrMapOvr>
+  <p:timing>
+    <p:tnLst>
+      <p:par>
+        <p:cTn xmlns:p14="http://schemas.microsoft.com/office/powerpoint/2010/main" id="1" dur="indefinite" restart="never" nodeType="tmRoot"/>
+      </p:par>
+    </p:tnLst>
+  </p:timing>
+</p:sld>
+</file>
+
+<file path=ppt/slides/slide47.xml><?xml version="1.0" encoding="utf-8"?>
+<p:sld xmlns:a="http://schemas.openxmlformats.org/drawingml/2006/main" xmlns:r="http://schemas.openxmlformats.org/officeDocument/2006/relationships" xmlns:p="http://schemas.openxmlformats.org/presentationml/2006/main">
+  <p:cSld>
+    <p:spTree>
+      <p:nvGrpSpPr>
+        <p:cNvPr id="1" name=""/>
+        <p:cNvGrpSpPr/>
+        <p:nvPr/>
+      </p:nvGrpSpPr>
+      <p:grpSpPr>
+        <a:xfrm>
+          <a:off x="0" y="0"/>
+          <a:ext cx="0" cy="0"/>
+          <a:chOff x="0" y="0"/>
+          <a:chExt cx="0" cy="0"/>
+        </a:xfrm>
+      </p:grpSpPr>
+      <p:sp>
+        <p:nvSpPr>
+          <p:cNvPr id="2" name="Title 1"/>
+          <p:cNvSpPr>
+            <a:spLocks noGrp="1"/>
+          </p:cNvSpPr>
+          <p:nvPr>
+            <p:ph type="title"/>
+          </p:nvPr>
+        </p:nvSpPr>
+        <p:spPr/>
+        <p:txBody>
+          <a:bodyPr/>
+          <a:lstStyle/>
+          <a:p>
+            <a:r>
+              <a:rPr lang="en-US" dirty="0" smtClean="0"/>
+              <a:t>Lesson 01</a:t>
+            </a:r>
+            <a:endParaRPr lang="en-US" dirty="0"/>
+          </a:p>
+        </p:txBody>
+      </p:sp>
+      <p:sp>
+        <p:nvSpPr>
+          <p:cNvPr id="3" name="Content Placeholder 2"/>
+          <p:cNvSpPr>
+            <a:spLocks noGrp="1"/>
+          </p:cNvSpPr>
+          <p:nvPr>
+            <p:ph idx="1"/>
+          </p:nvPr>
+        </p:nvSpPr>
+        <p:spPr>
+          <a:xfrm>
+            <a:off x="0" y="1199924"/>
+            <a:ext cx="9144000" cy="4525963"/>
+          </a:xfrm>
+        </p:spPr>
+        <p:txBody>
+          <a:bodyPr>
+            <a:normAutofit fontScale="70000" lnSpcReduction="20000"/>
+          </a:bodyPr>
+          <a:lstStyle/>
+          <a:p>
+            <a:r>
+              <a:rPr lang="en-US" sz="4800" dirty="0" smtClean="0"/>
+              <a:t>Similar for the square.</a:t>
+            </a:r>
+          </a:p>
+          <a:p>
+            <a:r>
+              <a:rPr lang="en-US" sz="4800" dirty="0" smtClean="0"/>
+              <a:t>But, build square geometry out of 2 triangles.</a:t>
+            </a:r>
+            <a:endParaRPr lang="en-US" sz="4800" dirty="0" smtClean="0"/>
+          </a:p>
+          <a:p>
+            <a:endParaRPr lang="en-US" sz="1600" dirty="0" smtClean="0">
+              <a:solidFill>
+                <a:srgbClr val="0000FF"/>
+              </a:solidFill>
+              <a:latin typeface="Lucida Console"/>
+              <a:cs typeface="Lucida Console"/>
+            </a:endParaRPr>
+          </a:p>
+          <a:p>
+            <a:pPr marL="0" indent="0">
+              <a:buNone/>
+            </a:pPr>
+            <a:r>
+              <a:rPr lang="en-US" sz="3600" dirty="0" err="1">
+                <a:solidFill>
+                  <a:srgbClr val="0000FF"/>
+                </a:solidFill>
+                <a:latin typeface="Lucida Console"/>
+                <a:cs typeface="Lucida Console"/>
+              </a:rPr>
+              <a:t>var</a:t>
+            </a:r>
+            <a:r>
+              <a:rPr lang="en-US" sz="3600" dirty="0">
+                <a:solidFill>
+                  <a:srgbClr val="0000FF"/>
+                </a:solidFill>
+                <a:latin typeface="Lucida Console"/>
+                <a:cs typeface="Lucida Console"/>
+              </a:rPr>
+              <a:t> </a:t>
+            </a:r>
+            <a:r>
+              <a:rPr lang="en-US" sz="3600" dirty="0" err="1">
+                <a:solidFill>
+                  <a:srgbClr val="0000FF"/>
+                </a:solidFill>
+                <a:latin typeface="Lucida Console"/>
+                <a:cs typeface="Lucida Console"/>
+              </a:rPr>
+              <a:t>squareGeometry</a:t>
+            </a:r>
+            <a:r>
+              <a:rPr lang="en-US" sz="3600" dirty="0">
+                <a:solidFill>
+                  <a:srgbClr val="0000FF"/>
+                </a:solidFill>
+                <a:latin typeface="Lucida Console"/>
+                <a:cs typeface="Lucida Console"/>
+              </a:rPr>
+              <a:t> = new </a:t>
+            </a:r>
+            <a:r>
+              <a:rPr lang="en-US" sz="3600" dirty="0" err="1">
+                <a:solidFill>
+                  <a:srgbClr val="0000FF"/>
+                </a:solidFill>
+                <a:latin typeface="Lucida Console"/>
+                <a:cs typeface="Lucida Console"/>
+              </a:rPr>
+              <a:t>THREE.Geometry</a:t>
+            </a:r>
+            <a:r>
+              <a:rPr lang="en-US" sz="3600" dirty="0">
+                <a:solidFill>
+                  <a:srgbClr val="0000FF"/>
+                </a:solidFill>
+                <a:latin typeface="Lucida Console"/>
+                <a:cs typeface="Lucida Console"/>
+              </a:rPr>
+              <a:t>();</a:t>
+            </a:r>
+          </a:p>
+          <a:p>
+            <a:pPr marL="0" indent="0">
+              <a:buNone/>
+            </a:pPr>
+            <a:r>
+              <a:rPr lang="en-US" sz="3600" dirty="0" err="1">
+                <a:solidFill>
+                  <a:srgbClr val="0000FF"/>
+                </a:solidFill>
+                <a:latin typeface="Lucida Console"/>
+                <a:cs typeface="Lucida Console"/>
+              </a:rPr>
+              <a:t>squareGeometry.vertices.push</a:t>
+            </a:r>
+            <a:r>
+              <a:rPr lang="en-US" sz="3600" dirty="0">
+                <a:solidFill>
+                  <a:srgbClr val="0000FF"/>
+                </a:solidFill>
+                <a:latin typeface="Lucida Console"/>
+                <a:cs typeface="Lucida Console"/>
+              </a:rPr>
+              <a:t>(new </a:t>
+            </a:r>
+            <a:r>
+              <a:rPr lang="en-US" sz="3600" dirty="0" smtClean="0">
+                <a:solidFill>
+                  <a:srgbClr val="0000FF"/>
+                </a:solidFill>
+                <a:latin typeface="Lucida Console"/>
+                <a:cs typeface="Lucida Console"/>
+              </a:rPr>
+              <a:t>  </a:t>
+            </a:r>
+            <a:br>
+              <a:rPr lang="en-US" sz="3600" dirty="0" smtClean="0">
+                <a:solidFill>
+                  <a:srgbClr val="0000FF"/>
+                </a:solidFill>
+                <a:latin typeface="Lucida Console"/>
+                <a:cs typeface="Lucida Console"/>
+              </a:rPr>
+            </a:br>
+            <a:r>
+              <a:rPr lang="en-US" sz="3600" dirty="0" smtClean="0">
+                <a:solidFill>
+                  <a:srgbClr val="0000FF"/>
+                </a:solidFill>
+                <a:latin typeface="Lucida Console"/>
+                <a:cs typeface="Lucida Console"/>
+              </a:rPr>
+              <a:t>   THREE.Vector3</a:t>
+            </a:r>
+            <a:r>
+              <a:rPr lang="en-US" sz="3600" dirty="0">
+                <a:solidFill>
+                  <a:srgbClr val="0000FF"/>
+                </a:solidFill>
+                <a:latin typeface="Lucida Console"/>
+                <a:cs typeface="Lucida Console"/>
+              </a:rPr>
+              <a:t>(-1.0,  1.0, 0.0));</a:t>
+            </a:r>
+          </a:p>
+          <a:p>
+            <a:pPr marL="0" indent="0">
+              <a:buNone/>
+            </a:pPr>
+            <a:r>
+              <a:rPr lang="en-US" sz="3600" dirty="0" err="1">
+                <a:solidFill>
+                  <a:srgbClr val="0000FF"/>
+                </a:solidFill>
+                <a:latin typeface="Lucida Console"/>
+                <a:cs typeface="Lucida Console"/>
+              </a:rPr>
+              <a:t>squareGeometry.vertices.push</a:t>
+            </a:r>
+            <a:r>
+              <a:rPr lang="en-US" sz="3600" dirty="0">
+                <a:solidFill>
+                  <a:srgbClr val="0000FF"/>
+                </a:solidFill>
+                <a:latin typeface="Lucida Console"/>
+                <a:cs typeface="Lucida Console"/>
+              </a:rPr>
+              <a:t>(new </a:t>
+            </a:r>
+            <a:r>
+              <a:rPr lang="en-US" sz="3600" dirty="0" smtClean="0">
+                <a:solidFill>
+                  <a:srgbClr val="0000FF"/>
+                </a:solidFill>
+                <a:latin typeface="Lucida Console"/>
+                <a:cs typeface="Lucida Console"/>
+              </a:rPr>
+              <a:t/>
+            </a:r>
+            <a:br>
+              <a:rPr lang="en-US" sz="3600" dirty="0" smtClean="0">
+                <a:solidFill>
+                  <a:srgbClr val="0000FF"/>
+                </a:solidFill>
+                <a:latin typeface="Lucida Console"/>
+                <a:cs typeface="Lucida Console"/>
+              </a:rPr>
+            </a:br>
+            <a:r>
+              <a:rPr lang="en-US" sz="3600" dirty="0" smtClean="0">
+                <a:solidFill>
+                  <a:srgbClr val="0000FF"/>
+                </a:solidFill>
+                <a:latin typeface="Lucida Console"/>
+                <a:cs typeface="Lucida Console"/>
+              </a:rPr>
+              <a:t>   THREE.Vector3</a:t>
+            </a:r>
+            <a:r>
+              <a:rPr lang="en-US" sz="3600" dirty="0">
+                <a:solidFill>
+                  <a:srgbClr val="0000FF"/>
+                </a:solidFill>
+                <a:latin typeface="Lucida Console"/>
+                <a:cs typeface="Lucida Console"/>
+              </a:rPr>
+              <a:t>( 1.0,  1.0, 0.0));</a:t>
+            </a:r>
+          </a:p>
+          <a:p>
+            <a:pPr marL="0" indent="0">
+              <a:buNone/>
+            </a:pPr>
+            <a:r>
+              <a:rPr lang="en-US" sz="3600" dirty="0" err="1">
+                <a:solidFill>
+                  <a:srgbClr val="0000FF"/>
+                </a:solidFill>
+                <a:latin typeface="Lucida Console"/>
+                <a:cs typeface="Lucida Console"/>
+              </a:rPr>
+              <a:t>squareGeometry.vertices.push</a:t>
+            </a:r>
+            <a:r>
+              <a:rPr lang="en-US" sz="3600" dirty="0">
+                <a:solidFill>
+                  <a:srgbClr val="0000FF"/>
+                </a:solidFill>
+                <a:latin typeface="Lucida Console"/>
+                <a:cs typeface="Lucida Console"/>
+              </a:rPr>
+              <a:t>(new </a:t>
+            </a:r>
+            <a:r>
+              <a:rPr lang="en-US" sz="3600" dirty="0" smtClean="0">
+                <a:solidFill>
+                  <a:srgbClr val="0000FF"/>
+                </a:solidFill>
+                <a:latin typeface="Lucida Console"/>
+                <a:cs typeface="Lucida Console"/>
+              </a:rPr>
+              <a:t/>
+            </a:r>
+            <a:br>
+              <a:rPr lang="en-US" sz="3600" dirty="0" smtClean="0">
+                <a:solidFill>
+                  <a:srgbClr val="0000FF"/>
+                </a:solidFill>
+                <a:latin typeface="Lucida Console"/>
+                <a:cs typeface="Lucida Console"/>
+              </a:rPr>
+            </a:br>
+            <a:r>
+              <a:rPr lang="en-US" sz="3600" dirty="0" smtClean="0">
+                <a:solidFill>
+                  <a:srgbClr val="0000FF"/>
+                </a:solidFill>
+                <a:latin typeface="Lucida Console"/>
+                <a:cs typeface="Lucida Console"/>
+              </a:rPr>
+              <a:t>   THREE.Vector3</a:t>
+            </a:r>
+            <a:r>
+              <a:rPr lang="en-US" sz="3600" dirty="0">
+                <a:solidFill>
+                  <a:srgbClr val="0000FF"/>
+                </a:solidFill>
+                <a:latin typeface="Lucida Console"/>
+                <a:cs typeface="Lucida Console"/>
+              </a:rPr>
+              <a:t>( 1.0, -1.0, 0.0));</a:t>
+            </a:r>
+          </a:p>
+          <a:p>
+            <a:pPr marL="0" indent="0">
+              <a:buNone/>
+            </a:pPr>
+            <a:r>
+              <a:rPr lang="en-US" sz="3600" dirty="0" err="1">
+                <a:solidFill>
+                  <a:srgbClr val="0000FF"/>
+                </a:solidFill>
+                <a:latin typeface="Lucida Console"/>
+                <a:cs typeface="Lucida Console"/>
+              </a:rPr>
+              <a:t>squareGeometry.vertices.push</a:t>
+            </a:r>
+            <a:r>
+              <a:rPr lang="en-US" sz="3600" dirty="0">
+                <a:solidFill>
+                  <a:srgbClr val="0000FF"/>
+                </a:solidFill>
+                <a:latin typeface="Lucida Console"/>
+                <a:cs typeface="Lucida Console"/>
+              </a:rPr>
+              <a:t>(new </a:t>
+            </a:r>
+            <a:r>
+              <a:rPr lang="en-US" sz="3600" dirty="0" smtClean="0">
+                <a:solidFill>
+                  <a:srgbClr val="0000FF"/>
+                </a:solidFill>
+                <a:latin typeface="Lucida Console"/>
+                <a:cs typeface="Lucida Console"/>
+              </a:rPr>
+              <a:t/>
+            </a:r>
+            <a:br>
+              <a:rPr lang="en-US" sz="3600" dirty="0" smtClean="0">
+                <a:solidFill>
+                  <a:srgbClr val="0000FF"/>
+                </a:solidFill>
+                <a:latin typeface="Lucida Console"/>
+                <a:cs typeface="Lucida Console"/>
+              </a:rPr>
+            </a:br>
+            <a:r>
+              <a:rPr lang="en-US" sz="3600" dirty="0" smtClean="0">
+                <a:solidFill>
+                  <a:srgbClr val="0000FF"/>
+                </a:solidFill>
+                <a:latin typeface="Lucida Console"/>
+                <a:cs typeface="Lucida Console"/>
+              </a:rPr>
+              <a:t>   THREE.Vector3</a:t>
+            </a:r>
+            <a:r>
+              <a:rPr lang="en-US" sz="3600" dirty="0">
+                <a:solidFill>
+                  <a:srgbClr val="0000FF"/>
+                </a:solidFill>
+                <a:latin typeface="Lucida Console"/>
+                <a:cs typeface="Lucida Console"/>
+              </a:rPr>
+              <a:t>(-1.0, -1.0, 0.0));</a:t>
+            </a:r>
+          </a:p>
+          <a:p>
+            <a:pPr marL="0" indent="0">
+              <a:buNone/>
+            </a:pPr>
+            <a:r>
+              <a:rPr lang="en-US" sz="3600" dirty="0" err="1">
+                <a:solidFill>
+                  <a:srgbClr val="0000FF"/>
+                </a:solidFill>
+                <a:latin typeface="Lucida Console"/>
+                <a:cs typeface="Lucida Console"/>
+              </a:rPr>
+              <a:t>squareGeometry.faces.push</a:t>
+            </a:r>
+            <a:r>
+              <a:rPr lang="en-US" sz="3600" dirty="0" smtClean="0">
+                <a:solidFill>
+                  <a:srgbClr val="0000FF"/>
+                </a:solidFill>
+                <a:latin typeface="Lucida Console"/>
+                <a:cs typeface="Lucida Console"/>
+              </a:rPr>
+              <a:t>(</a:t>
+            </a:r>
+            <a:br>
+              <a:rPr lang="en-US" sz="3600" dirty="0" smtClean="0">
+                <a:solidFill>
+                  <a:srgbClr val="0000FF"/>
+                </a:solidFill>
+                <a:latin typeface="Lucida Console"/>
+                <a:cs typeface="Lucida Console"/>
+              </a:rPr>
+            </a:br>
+            <a:r>
+              <a:rPr lang="en-US" sz="3600" dirty="0" smtClean="0">
+                <a:solidFill>
+                  <a:srgbClr val="0000FF"/>
+                </a:solidFill>
+                <a:latin typeface="Lucida Console"/>
+                <a:cs typeface="Lucida Console"/>
+              </a:rPr>
+              <a:t>   new </a:t>
+            </a:r>
+            <a:r>
+              <a:rPr lang="en-US" sz="3600" dirty="0">
+                <a:solidFill>
+                  <a:srgbClr val="0000FF"/>
+                </a:solidFill>
+                <a:latin typeface="Lucida Console"/>
+                <a:cs typeface="Lucida Console"/>
+              </a:rPr>
+              <a:t>THREE.Face3(0, 1, 2));</a:t>
+            </a:r>
+          </a:p>
+          <a:p>
+            <a:pPr marL="0" indent="0">
+              <a:buNone/>
+            </a:pPr>
+            <a:r>
+              <a:rPr lang="en-US" sz="3600" dirty="0" err="1">
+                <a:solidFill>
+                  <a:srgbClr val="0000FF"/>
+                </a:solidFill>
+                <a:latin typeface="Lucida Console"/>
+                <a:cs typeface="Lucida Console"/>
+              </a:rPr>
+              <a:t>squareGeometry.faces.push</a:t>
+            </a:r>
+            <a:r>
+              <a:rPr lang="en-US" sz="3600" dirty="0" smtClean="0">
+                <a:solidFill>
+                  <a:srgbClr val="0000FF"/>
+                </a:solidFill>
+                <a:latin typeface="Lucida Console"/>
+                <a:cs typeface="Lucida Console"/>
+              </a:rPr>
+              <a:t>(</a:t>
+            </a:r>
+            <a:br>
+              <a:rPr lang="en-US" sz="3600" dirty="0" smtClean="0">
+                <a:solidFill>
+                  <a:srgbClr val="0000FF"/>
+                </a:solidFill>
+                <a:latin typeface="Lucida Console"/>
+                <a:cs typeface="Lucida Console"/>
+              </a:rPr>
+            </a:br>
+            <a:r>
+              <a:rPr lang="en-US" sz="3600" dirty="0" smtClean="0">
+                <a:solidFill>
+                  <a:srgbClr val="0000FF"/>
+                </a:solidFill>
+                <a:latin typeface="Lucida Console"/>
+                <a:cs typeface="Lucida Console"/>
+              </a:rPr>
+              <a:t>   new </a:t>
+            </a:r>
+            <a:r>
+              <a:rPr lang="en-US" sz="3600" dirty="0">
+                <a:solidFill>
+                  <a:srgbClr val="0000FF"/>
+                </a:solidFill>
+                <a:latin typeface="Lucida Console"/>
+                <a:cs typeface="Lucida Console"/>
+              </a:rPr>
+              <a:t>THREE.Face3(0, 2, 3));</a:t>
+            </a:r>
+            <a:endParaRPr lang="en-US" sz="3600" dirty="0" smtClean="0">
+              <a:solidFill>
+                <a:srgbClr val="0000FF"/>
+              </a:solidFill>
+              <a:latin typeface="Lucida Console"/>
+              <a:cs typeface="Lucida Console"/>
+            </a:endParaRPr>
+          </a:p>
+        </p:txBody>
+      </p:sp>
+    </p:spTree>
+    <p:extLst>
+      <p:ext uri="{BB962C8B-B14F-4D97-AF65-F5344CB8AC3E}">
+        <p14:creationId xmlns:p14="http://schemas.microsoft.com/office/powerpoint/2010/main" val="3670857342"/>
+      </p:ext>
+    </p:extLst>
+  </p:cSld>
+  <p:clrMapOvr>
+    <a:masterClrMapping/>
+  </p:clrMapOvr>
+  <p:timing>
+    <p:tnLst>
+      <p:par>
+        <p:cTn xmlns:p14="http://schemas.microsoft.com/office/powerpoint/2010/main" id="1" dur="indefinite" restart="never" nodeType="tmRoot"/>
+      </p:par>
+    </p:tnLst>
+  </p:timing>
+</p:sld>
+</file>
+
+<file path=ppt/slides/slide48.xml><?xml version="1.0" encoding="utf-8"?>
+<p:sld xmlns:a="http://schemas.openxmlformats.org/drawingml/2006/main" xmlns:r="http://schemas.openxmlformats.org/officeDocument/2006/relationships" xmlns:p="http://schemas.openxmlformats.org/presentationml/2006/main">
+  <p:cSld>
+    <p:spTree>
+      <p:nvGrpSpPr>
+        <p:cNvPr id="1" name=""/>
+        <p:cNvGrpSpPr/>
+        <p:nvPr/>
+      </p:nvGrpSpPr>
+      <p:grpSpPr>
+        <a:xfrm>
+          <a:off x="0" y="0"/>
+          <a:ext cx="0" cy="0"/>
+          <a:chOff x="0" y="0"/>
+          <a:chExt cx="0" cy="0"/>
+        </a:xfrm>
+      </p:grpSpPr>
+      <p:sp>
+        <p:nvSpPr>
+          <p:cNvPr id="2" name="Title 1"/>
+          <p:cNvSpPr>
+            <a:spLocks noGrp="1"/>
+          </p:cNvSpPr>
+          <p:nvPr>
+            <p:ph type="title"/>
+          </p:nvPr>
+        </p:nvSpPr>
+        <p:spPr/>
+        <p:txBody>
+          <a:bodyPr/>
+          <a:lstStyle/>
+          <a:p>
+            <a:r>
+              <a:rPr lang="en-US" dirty="0" smtClean="0"/>
+              <a:t>Lesson 01</a:t>
+            </a:r>
+            <a:endParaRPr lang="en-US" dirty="0"/>
+          </a:p>
+        </p:txBody>
+      </p:sp>
+      <p:sp>
+        <p:nvSpPr>
+          <p:cNvPr id="3" name="Content Placeholder 2"/>
+          <p:cNvSpPr>
+            <a:spLocks noGrp="1"/>
+          </p:cNvSpPr>
+          <p:nvPr>
+            <p:ph idx="1"/>
+          </p:nvPr>
+        </p:nvSpPr>
+        <p:spPr>
+          <a:xfrm>
+            <a:off x="0" y="1199924"/>
+            <a:ext cx="9144000" cy="4525963"/>
+          </a:xfrm>
+        </p:spPr>
+        <p:txBody>
+          <a:bodyPr>
+            <a:normAutofit fontScale="70000" lnSpcReduction="20000"/>
+          </a:bodyPr>
+          <a:lstStyle/>
+          <a:p>
+            <a:r>
+              <a:rPr lang="en-US" sz="4800" dirty="0" smtClean="0"/>
+              <a:t>Similar for the square.</a:t>
+            </a:r>
+          </a:p>
+          <a:p>
+            <a:r>
+              <a:rPr lang="en-US" sz="4800" dirty="0" smtClean="0"/>
+              <a:t>But, build square geometry out of 2 triangles.</a:t>
+            </a:r>
+            <a:endParaRPr lang="en-US" sz="4800" dirty="0" smtClean="0"/>
+          </a:p>
+          <a:p>
+            <a:endParaRPr lang="en-US" sz="1600" dirty="0" smtClean="0">
+              <a:solidFill>
+                <a:srgbClr val="0000FF"/>
+              </a:solidFill>
+              <a:latin typeface="Lucida Console"/>
+              <a:cs typeface="Lucida Console"/>
+            </a:endParaRPr>
+          </a:p>
+          <a:p>
+            <a:pPr marL="0" indent="0">
+              <a:buNone/>
+            </a:pPr>
+            <a:r>
+              <a:rPr lang="en-US" sz="3600" dirty="0" err="1">
+                <a:solidFill>
+                  <a:srgbClr val="0000FF"/>
+                </a:solidFill>
+                <a:latin typeface="Lucida Console"/>
+                <a:cs typeface="Lucida Console"/>
+              </a:rPr>
+              <a:t>var</a:t>
+            </a:r>
+            <a:r>
+              <a:rPr lang="en-US" sz="3600" dirty="0">
+                <a:solidFill>
+                  <a:srgbClr val="0000FF"/>
+                </a:solidFill>
+                <a:latin typeface="Lucida Console"/>
+                <a:cs typeface="Lucida Console"/>
+              </a:rPr>
+              <a:t> </a:t>
+            </a:r>
+            <a:r>
+              <a:rPr lang="en-US" sz="3600" dirty="0" err="1">
+                <a:solidFill>
+                  <a:srgbClr val="0000FF"/>
+                </a:solidFill>
+                <a:latin typeface="Lucida Console"/>
+                <a:cs typeface="Lucida Console"/>
+              </a:rPr>
+              <a:t>squareGeometry</a:t>
+            </a:r>
+            <a:r>
+              <a:rPr lang="en-US" sz="3600" dirty="0">
+                <a:solidFill>
+                  <a:srgbClr val="0000FF"/>
+                </a:solidFill>
+                <a:latin typeface="Lucida Console"/>
+                <a:cs typeface="Lucida Console"/>
+              </a:rPr>
+              <a:t> = new </a:t>
+            </a:r>
+            <a:r>
+              <a:rPr lang="en-US" sz="3600" dirty="0" err="1">
+                <a:solidFill>
+                  <a:srgbClr val="0000FF"/>
+                </a:solidFill>
+                <a:latin typeface="Lucida Console"/>
+                <a:cs typeface="Lucida Console"/>
+              </a:rPr>
+              <a:t>THREE.Geometry</a:t>
+            </a:r>
+            <a:r>
+              <a:rPr lang="en-US" sz="3600" dirty="0">
+                <a:solidFill>
+                  <a:srgbClr val="0000FF"/>
+                </a:solidFill>
+                <a:latin typeface="Lucida Console"/>
+                <a:cs typeface="Lucida Console"/>
+              </a:rPr>
+              <a:t>();</a:t>
+            </a:r>
+          </a:p>
+          <a:p>
+            <a:pPr marL="0" indent="0">
+              <a:buNone/>
+            </a:pPr>
+            <a:r>
+              <a:rPr lang="en-US" sz="3600" dirty="0" err="1">
+                <a:solidFill>
+                  <a:srgbClr val="0000FF"/>
+                </a:solidFill>
+                <a:latin typeface="Lucida Console"/>
+                <a:cs typeface="Lucida Console"/>
+              </a:rPr>
+              <a:t>squareGeometry.vertices.push</a:t>
+            </a:r>
+            <a:r>
+              <a:rPr lang="en-US" sz="3600" dirty="0">
+                <a:solidFill>
+                  <a:srgbClr val="0000FF"/>
+                </a:solidFill>
+                <a:latin typeface="Lucida Console"/>
+                <a:cs typeface="Lucida Console"/>
+              </a:rPr>
+              <a:t>(new </a:t>
+            </a:r>
+            <a:r>
+              <a:rPr lang="en-US" sz="3600" dirty="0" smtClean="0">
+                <a:solidFill>
+                  <a:srgbClr val="0000FF"/>
+                </a:solidFill>
+                <a:latin typeface="Lucida Console"/>
+                <a:cs typeface="Lucida Console"/>
+              </a:rPr>
+              <a:t>  </a:t>
+            </a:r>
+            <a:br>
+              <a:rPr lang="en-US" sz="3600" dirty="0" smtClean="0">
+                <a:solidFill>
+                  <a:srgbClr val="0000FF"/>
+                </a:solidFill>
+                <a:latin typeface="Lucida Console"/>
+                <a:cs typeface="Lucida Console"/>
+              </a:rPr>
+            </a:br>
+            <a:r>
+              <a:rPr lang="en-US" sz="3600" dirty="0" smtClean="0">
+                <a:solidFill>
+                  <a:srgbClr val="0000FF"/>
+                </a:solidFill>
+                <a:latin typeface="Lucida Console"/>
+                <a:cs typeface="Lucida Console"/>
+              </a:rPr>
+              <a:t>   THREE.Vector3</a:t>
+            </a:r>
+            <a:r>
+              <a:rPr lang="en-US" sz="3600" dirty="0">
+                <a:solidFill>
+                  <a:srgbClr val="0000FF"/>
+                </a:solidFill>
+                <a:latin typeface="Lucida Console"/>
+                <a:cs typeface="Lucida Console"/>
+              </a:rPr>
+              <a:t>(-1.0,  1.0, 0.0));</a:t>
+            </a:r>
+          </a:p>
+          <a:p>
+            <a:pPr marL="0" indent="0">
+              <a:buNone/>
+            </a:pPr>
+            <a:r>
+              <a:rPr lang="en-US" sz="3600" dirty="0" err="1">
+                <a:solidFill>
+                  <a:srgbClr val="0000FF"/>
+                </a:solidFill>
+                <a:latin typeface="Lucida Console"/>
+                <a:cs typeface="Lucida Console"/>
+              </a:rPr>
+              <a:t>squareGeometry.vertices.push</a:t>
+            </a:r>
+            <a:r>
+              <a:rPr lang="en-US" sz="3600" dirty="0">
+                <a:solidFill>
+                  <a:srgbClr val="0000FF"/>
+                </a:solidFill>
+                <a:latin typeface="Lucida Console"/>
+                <a:cs typeface="Lucida Console"/>
+              </a:rPr>
+              <a:t>(new </a:t>
+            </a:r>
+            <a:r>
+              <a:rPr lang="en-US" sz="3600" dirty="0" smtClean="0">
+                <a:solidFill>
+                  <a:srgbClr val="0000FF"/>
+                </a:solidFill>
+                <a:latin typeface="Lucida Console"/>
+                <a:cs typeface="Lucida Console"/>
+              </a:rPr>
+              <a:t/>
+            </a:r>
+            <a:br>
+              <a:rPr lang="en-US" sz="3600" dirty="0" smtClean="0">
+                <a:solidFill>
+                  <a:srgbClr val="0000FF"/>
+                </a:solidFill>
+                <a:latin typeface="Lucida Console"/>
+                <a:cs typeface="Lucida Console"/>
+              </a:rPr>
+            </a:br>
+            <a:r>
+              <a:rPr lang="en-US" sz="3600" dirty="0" smtClean="0">
+                <a:solidFill>
+                  <a:srgbClr val="0000FF"/>
+                </a:solidFill>
+                <a:latin typeface="Lucida Console"/>
+                <a:cs typeface="Lucida Console"/>
+              </a:rPr>
+              <a:t>   THREE.Vector3</a:t>
+            </a:r>
+            <a:r>
+              <a:rPr lang="en-US" sz="3600" dirty="0">
+                <a:solidFill>
+                  <a:srgbClr val="0000FF"/>
+                </a:solidFill>
+                <a:latin typeface="Lucida Console"/>
+                <a:cs typeface="Lucida Console"/>
+              </a:rPr>
+              <a:t>( 1.0,  1.0, 0.0));</a:t>
+            </a:r>
+          </a:p>
+          <a:p>
+            <a:pPr marL="0" indent="0">
+              <a:buNone/>
+            </a:pPr>
+            <a:r>
+              <a:rPr lang="en-US" sz="3600" dirty="0" err="1">
+                <a:solidFill>
+                  <a:srgbClr val="0000FF"/>
+                </a:solidFill>
+                <a:latin typeface="Lucida Console"/>
+                <a:cs typeface="Lucida Console"/>
+              </a:rPr>
+              <a:t>squareGeometry.vertices.push</a:t>
+            </a:r>
+            <a:r>
+              <a:rPr lang="en-US" sz="3600" dirty="0">
+                <a:solidFill>
+                  <a:srgbClr val="0000FF"/>
+                </a:solidFill>
+                <a:latin typeface="Lucida Console"/>
+                <a:cs typeface="Lucida Console"/>
+              </a:rPr>
+              <a:t>(new </a:t>
+            </a:r>
+            <a:r>
+              <a:rPr lang="en-US" sz="3600" dirty="0" smtClean="0">
+                <a:solidFill>
+                  <a:srgbClr val="0000FF"/>
+                </a:solidFill>
+                <a:latin typeface="Lucida Console"/>
+                <a:cs typeface="Lucida Console"/>
+              </a:rPr>
+              <a:t/>
+            </a:r>
+            <a:br>
+              <a:rPr lang="en-US" sz="3600" dirty="0" smtClean="0">
+                <a:solidFill>
+                  <a:srgbClr val="0000FF"/>
+                </a:solidFill>
+                <a:latin typeface="Lucida Console"/>
+                <a:cs typeface="Lucida Console"/>
+              </a:rPr>
+            </a:br>
+            <a:r>
+              <a:rPr lang="en-US" sz="3600" dirty="0" smtClean="0">
+                <a:solidFill>
+                  <a:srgbClr val="0000FF"/>
+                </a:solidFill>
+                <a:latin typeface="Lucida Console"/>
+                <a:cs typeface="Lucida Console"/>
+              </a:rPr>
+              <a:t>   THREE.Vector3</a:t>
+            </a:r>
+            <a:r>
+              <a:rPr lang="en-US" sz="3600" dirty="0">
+                <a:solidFill>
+                  <a:srgbClr val="0000FF"/>
+                </a:solidFill>
+                <a:latin typeface="Lucida Console"/>
+                <a:cs typeface="Lucida Console"/>
+              </a:rPr>
+              <a:t>( 1.0, -1.0, 0.0));</a:t>
+            </a:r>
+          </a:p>
+          <a:p>
+            <a:pPr marL="0" indent="0">
+              <a:buNone/>
+            </a:pPr>
+            <a:r>
+              <a:rPr lang="en-US" sz="3600" dirty="0" err="1">
+                <a:solidFill>
+                  <a:srgbClr val="0000FF"/>
+                </a:solidFill>
+                <a:latin typeface="Lucida Console"/>
+                <a:cs typeface="Lucida Console"/>
+              </a:rPr>
+              <a:t>squareGeometry.vertices.push</a:t>
+            </a:r>
+            <a:r>
+              <a:rPr lang="en-US" sz="3600" dirty="0">
+                <a:solidFill>
+                  <a:srgbClr val="0000FF"/>
+                </a:solidFill>
+                <a:latin typeface="Lucida Console"/>
+                <a:cs typeface="Lucida Console"/>
+              </a:rPr>
+              <a:t>(new </a:t>
+            </a:r>
+            <a:r>
+              <a:rPr lang="en-US" sz="3600" dirty="0" smtClean="0">
+                <a:solidFill>
+                  <a:srgbClr val="0000FF"/>
+                </a:solidFill>
+                <a:latin typeface="Lucida Console"/>
+                <a:cs typeface="Lucida Console"/>
+              </a:rPr>
+              <a:t/>
+            </a:r>
+            <a:br>
+              <a:rPr lang="en-US" sz="3600" dirty="0" smtClean="0">
+                <a:solidFill>
+                  <a:srgbClr val="0000FF"/>
+                </a:solidFill>
+                <a:latin typeface="Lucida Console"/>
+                <a:cs typeface="Lucida Console"/>
+              </a:rPr>
+            </a:br>
+            <a:r>
+              <a:rPr lang="en-US" sz="3600" dirty="0" smtClean="0">
+                <a:solidFill>
+                  <a:srgbClr val="0000FF"/>
+                </a:solidFill>
+                <a:latin typeface="Lucida Console"/>
+                <a:cs typeface="Lucida Console"/>
+              </a:rPr>
+              <a:t>   THREE.Vector3</a:t>
+            </a:r>
+            <a:r>
+              <a:rPr lang="en-US" sz="3600" dirty="0">
+                <a:solidFill>
+                  <a:srgbClr val="0000FF"/>
+                </a:solidFill>
+                <a:latin typeface="Lucida Console"/>
+                <a:cs typeface="Lucida Console"/>
+              </a:rPr>
+              <a:t>(-1.0, -1.0, 0.0));</a:t>
+            </a:r>
+          </a:p>
+          <a:p>
+            <a:pPr marL="0" indent="0">
+              <a:buNone/>
+            </a:pPr>
+            <a:r>
+              <a:rPr lang="en-US" sz="3600" dirty="0" err="1">
+                <a:solidFill>
+                  <a:srgbClr val="0000FF"/>
+                </a:solidFill>
+                <a:latin typeface="Lucida Console"/>
+                <a:cs typeface="Lucida Console"/>
+              </a:rPr>
+              <a:t>squareGeometry.faces.push</a:t>
+            </a:r>
+            <a:r>
+              <a:rPr lang="en-US" sz="3600" dirty="0" smtClean="0">
+                <a:solidFill>
+                  <a:srgbClr val="0000FF"/>
+                </a:solidFill>
+                <a:latin typeface="Lucida Console"/>
+                <a:cs typeface="Lucida Console"/>
+              </a:rPr>
+              <a:t>(</a:t>
+            </a:r>
+            <a:br>
+              <a:rPr lang="en-US" sz="3600" dirty="0" smtClean="0">
+                <a:solidFill>
+                  <a:srgbClr val="0000FF"/>
+                </a:solidFill>
+                <a:latin typeface="Lucida Console"/>
+                <a:cs typeface="Lucida Console"/>
+              </a:rPr>
+            </a:br>
+            <a:r>
+              <a:rPr lang="en-US" sz="3600" dirty="0" smtClean="0">
+                <a:solidFill>
+                  <a:srgbClr val="0000FF"/>
+                </a:solidFill>
+                <a:latin typeface="Lucida Console"/>
+                <a:cs typeface="Lucida Console"/>
+              </a:rPr>
+              <a:t>   new </a:t>
+            </a:r>
+            <a:r>
+              <a:rPr lang="en-US" sz="3600" dirty="0">
+                <a:solidFill>
+                  <a:srgbClr val="0000FF"/>
+                </a:solidFill>
+                <a:latin typeface="Lucida Console"/>
+                <a:cs typeface="Lucida Console"/>
+              </a:rPr>
+              <a:t>THREE.Face3(0, 1, 2));</a:t>
+            </a:r>
+          </a:p>
+          <a:p>
+            <a:pPr marL="0" indent="0">
+              <a:buNone/>
+            </a:pPr>
+            <a:r>
+              <a:rPr lang="en-US" sz="3600" dirty="0" err="1">
+                <a:solidFill>
+                  <a:srgbClr val="0000FF"/>
+                </a:solidFill>
+                <a:latin typeface="Lucida Console"/>
+                <a:cs typeface="Lucida Console"/>
+              </a:rPr>
+              <a:t>squareGeometry.faces.push</a:t>
+            </a:r>
+            <a:r>
+              <a:rPr lang="en-US" sz="3600" dirty="0" smtClean="0">
+                <a:solidFill>
+                  <a:srgbClr val="0000FF"/>
+                </a:solidFill>
+                <a:latin typeface="Lucida Console"/>
+                <a:cs typeface="Lucida Console"/>
+              </a:rPr>
+              <a:t>(</a:t>
+            </a:r>
+            <a:br>
+              <a:rPr lang="en-US" sz="3600" dirty="0" smtClean="0">
+                <a:solidFill>
+                  <a:srgbClr val="0000FF"/>
+                </a:solidFill>
+                <a:latin typeface="Lucida Console"/>
+                <a:cs typeface="Lucida Console"/>
+              </a:rPr>
+            </a:br>
+            <a:r>
+              <a:rPr lang="en-US" sz="3600" dirty="0" smtClean="0">
+                <a:solidFill>
+                  <a:srgbClr val="0000FF"/>
+                </a:solidFill>
+                <a:latin typeface="Lucida Console"/>
+                <a:cs typeface="Lucida Console"/>
+              </a:rPr>
+              <a:t>   new </a:t>
+            </a:r>
+            <a:r>
+              <a:rPr lang="en-US" sz="3600" dirty="0">
+                <a:solidFill>
+                  <a:srgbClr val="0000FF"/>
+                </a:solidFill>
+                <a:latin typeface="Lucida Console"/>
+                <a:cs typeface="Lucida Console"/>
+              </a:rPr>
+              <a:t>THREE.Face3(0, 2, 3));</a:t>
+            </a:r>
+            <a:endParaRPr lang="en-US" sz="3600" dirty="0" smtClean="0">
+              <a:solidFill>
+                <a:srgbClr val="0000FF"/>
+              </a:solidFill>
+              <a:latin typeface="Lucida Console"/>
+              <a:cs typeface="Lucida Console"/>
+            </a:endParaRPr>
+          </a:p>
+        </p:txBody>
+      </p:sp>
+    </p:spTree>
+    <p:extLst>
+      <p:ext uri="{BB962C8B-B14F-4D97-AF65-F5344CB8AC3E}">
+        <p14:creationId xmlns:p14="http://schemas.microsoft.com/office/powerpoint/2010/main" val="871949150"/>
+      </p:ext>
+    </p:extLst>
+  </p:cSld>
+  <p:clrMapOvr>
+    <a:masterClrMapping/>
+  </p:clrMapOvr>
+  <p:timing>
+    <p:tnLst>
+      <p:par>
+        <p:cTn xmlns:p14="http://schemas.microsoft.com/office/powerpoint/2010/main" id="1" dur="indefinite" restart="never" nodeType="tmRoot"/>
+      </p:par>
+    </p:tnLst>
+  </p:timing>
+</p:sld>
+</file>
+
+<file path=ppt/slides/slide49.xml><?xml version="1.0" encoding="utf-8"?>
+<p:sld xmlns:a="http://schemas.openxmlformats.org/drawingml/2006/main" xmlns:r="http://schemas.openxmlformats.org/officeDocument/2006/relationships" xmlns:p="http://schemas.openxmlformats.org/presentationml/2006/main">
+  <p:cSld>
+    <p:spTree>
+      <p:nvGrpSpPr>
+        <p:cNvPr id="1" name=""/>
+        <p:cNvGrpSpPr/>
+        <p:nvPr/>
+      </p:nvGrpSpPr>
+      <p:grpSpPr>
+        <a:xfrm>
+          <a:off x="0" y="0"/>
+          <a:ext cx="0" cy="0"/>
+          <a:chOff x="0" y="0"/>
+          <a:chExt cx="0" cy="0"/>
+        </a:xfrm>
+      </p:grpSpPr>
+      <p:sp>
+        <p:nvSpPr>
+          <p:cNvPr id="2" name="Title 1"/>
+          <p:cNvSpPr>
+            <a:spLocks noGrp="1"/>
+          </p:cNvSpPr>
+          <p:nvPr>
+            <p:ph type="title"/>
+          </p:nvPr>
+        </p:nvSpPr>
+        <p:spPr/>
+        <p:txBody>
+          <a:bodyPr>
+            <a:normAutofit fontScale="90000"/>
+          </a:bodyPr>
+          <a:lstStyle/>
+          <a:p>
+            <a:r>
+              <a:rPr lang="en-US" b="1" dirty="0" smtClean="0"/>
+              <a:t>Lesson 2: </a:t>
+            </a:r>
+            <a:r>
+              <a:rPr lang="en-US" b="1" dirty="0" smtClean="0"/>
+              <a:t>Color (</a:t>
+            </a:r>
+            <a:r>
+              <a:rPr lang="en-US" b="1" dirty="0" err="1" smtClean="0"/>
+              <a:t>Three.js</a:t>
+            </a:r>
+            <a:r>
+              <a:rPr lang="en-US" b="1" dirty="0" smtClean="0"/>
+              <a:t>)</a:t>
+            </a:r>
+            <a:endParaRPr lang="en-US" b="1" dirty="0"/>
+          </a:p>
+        </p:txBody>
+      </p:sp>
+      <p:pic>
+        <p:nvPicPr>
+          <p:cNvPr id="3" name="Picture 2" descr="Screen Shot 2015-04-16 at 4.28.47 PM.png"/>
+          <p:cNvPicPr>
+            <a:picLocks noChangeAspect="1"/>
+          </p:cNvPicPr>
+          <p:nvPr/>
+        </p:nvPicPr>
+        <p:blipFill>
+          <a:blip r:embed="rId2">
+            <a:extLst>
+              <a:ext uri="{28A0092B-C50C-407E-A947-70E740481C1C}">
+                <a14:useLocalDpi xmlns:a14="http://schemas.microsoft.com/office/drawing/2010/main" val="0"/>
+              </a:ext>
+            </a:extLst>
+          </a:blip>
+          <a:stretch>
+            <a:fillRect/>
+          </a:stretch>
+        </p:blipFill>
+        <p:spPr>
+          <a:xfrm>
+            <a:off x="1887746" y="1288319"/>
+            <a:ext cx="5368509" cy="5368509"/>
+          </a:xfrm>
+          <a:prstGeom prst="rect">
+            <a:avLst/>
+          </a:prstGeom>
+        </p:spPr>
+      </p:pic>
+    </p:spTree>
+    <p:extLst>
+      <p:ext uri="{BB962C8B-B14F-4D97-AF65-F5344CB8AC3E}">
+        <p14:creationId xmlns:p14="http://schemas.microsoft.com/office/powerpoint/2010/main" val="2201999963"/>
+      </p:ext>
+    </p:extLst>
+  </p:cSld>
+  <p:clrMapOvr>
+    <a:masterClrMapping/>
+  </p:clrMapOvr>
   <p:timing>
     <p:tnLst>
       <p:par>
@@ -19580,6 +23573,305 @@
   <p:clrMapOvr>
     <a:masterClrMapping/>
   </p:clrMapOvr>
+  <p:timing>
+    <p:tnLst>
+      <p:par>
+        <p:cTn xmlns:p14="http://schemas.microsoft.com/office/powerpoint/2010/main" id="1" dur="indefinite" restart="never" nodeType="tmRoot"/>
+      </p:par>
+    </p:tnLst>
+  </p:timing>
+</p:sld>
+</file>
+
+<file path=ppt/slides/slide50.xml><?xml version="1.0" encoding="utf-8"?>
+<p:sld xmlns:a="http://schemas.openxmlformats.org/drawingml/2006/main" xmlns:r="http://schemas.openxmlformats.org/officeDocument/2006/relationships" xmlns:p="http://schemas.openxmlformats.org/presentationml/2006/main">
+  <p:cSld>
+    <p:spTree>
+      <p:nvGrpSpPr>
+        <p:cNvPr id="1" name=""/>
+        <p:cNvGrpSpPr/>
+        <p:nvPr/>
+      </p:nvGrpSpPr>
+      <p:grpSpPr>
+        <a:xfrm>
+          <a:off x="0" y="0"/>
+          <a:ext cx="0" cy="0"/>
+          <a:chOff x="0" y="0"/>
+          <a:chExt cx="0" cy="0"/>
+        </a:xfrm>
+      </p:grpSpPr>
+      <p:sp>
+        <p:nvSpPr>
+          <p:cNvPr id="2" name="Title 1"/>
+          <p:cNvSpPr>
+            <a:spLocks noGrp="1"/>
+          </p:cNvSpPr>
+          <p:nvPr>
+            <p:ph type="title"/>
+          </p:nvPr>
+        </p:nvSpPr>
+        <p:spPr/>
+        <p:txBody>
+          <a:bodyPr/>
+          <a:lstStyle/>
+          <a:p>
+            <a:r>
+              <a:rPr lang="en-US" dirty="0" smtClean="0"/>
+              <a:t>Next Time…</a:t>
+            </a:r>
+            <a:endParaRPr lang="en-US" dirty="0"/>
+          </a:p>
+        </p:txBody>
+      </p:sp>
+      <p:sp>
+        <p:nvSpPr>
+          <p:cNvPr id="3" name="Content Placeholder 2"/>
+          <p:cNvSpPr>
+            <a:spLocks noGrp="1"/>
+          </p:cNvSpPr>
+          <p:nvPr>
+            <p:ph idx="1"/>
+          </p:nvPr>
+        </p:nvSpPr>
+        <p:spPr/>
+        <p:txBody>
+          <a:bodyPr/>
+          <a:lstStyle/>
+          <a:p>
+            <a:r>
+              <a:rPr lang="en-US" dirty="0" smtClean="0"/>
+              <a:t>Using </a:t>
+            </a:r>
+            <a:r>
+              <a:rPr lang="en-US" dirty="0" err="1" smtClean="0"/>
+              <a:t>Three.js</a:t>
+            </a:r>
+            <a:r>
+              <a:rPr lang="en-US" dirty="0" smtClean="0"/>
+              <a:t> to make </a:t>
+            </a:r>
+            <a:r>
+              <a:rPr lang="en-US" dirty="0" err="1" smtClean="0"/>
+              <a:t>WebGL</a:t>
+            </a:r>
+            <a:r>
+              <a:rPr lang="en-US" dirty="0" smtClean="0"/>
+              <a:t> more sane.</a:t>
+            </a:r>
+            <a:endParaRPr lang="en-US" dirty="0"/>
+          </a:p>
+        </p:txBody>
+      </p:sp>
+    </p:spTree>
+    <p:extLst>
+      <p:ext uri="{BB962C8B-B14F-4D97-AF65-F5344CB8AC3E}">
+        <p14:creationId xmlns:p14="http://schemas.microsoft.com/office/powerpoint/2010/main" val="212014411"/>
+      </p:ext>
+    </p:extLst>
+  </p:cSld>
+  <p:clrMapOvr>
+    <a:masterClrMapping/>
+  </p:clrMapOvr>
+  <p:timing>
+    <p:tnLst>
+      <p:par>
+        <p:cTn xmlns:p14="http://schemas.microsoft.com/office/powerpoint/2010/main" id="1" dur="indefinite" restart="never" nodeType="tmRoot"/>
+      </p:par>
+    </p:tnLst>
+  </p:timing>
+</p:sld>
+</file>
+
+<file path=ppt/slides/slide51.xml><?xml version="1.0" encoding="utf-8"?>
+<p:sld xmlns:a="http://schemas.openxmlformats.org/drawingml/2006/main" xmlns:r="http://schemas.openxmlformats.org/officeDocument/2006/relationships" xmlns:p="http://schemas.openxmlformats.org/presentationml/2006/main" show="0">
+  <p:cSld>
+    <p:spTree>
+      <p:nvGrpSpPr>
+        <p:cNvPr id="1" name=""/>
+        <p:cNvGrpSpPr/>
+        <p:nvPr/>
+      </p:nvGrpSpPr>
+      <p:grpSpPr>
+        <a:xfrm>
+          <a:off x="0" y="0"/>
+          <a:ext cx="0" cy="0"/>
+          <a:chOff x="0" y="0"/>
+          <a:chExt cx="0" cy="0"/>
+        </a:xfrm>
+      </p:grpSpPr>
+      <p:sp>
+        <p:nvSpPr>
+          <p:cNvPr id="2" name="Title 1"/>
+          <p:cNvSpPr>
+            <a:spLocks noGrp="1"/>
+          </p:cNvSpPr>
+          <p:nvPr>
+            <p:ph type="title"/>
+          </p:nvPr>
+        </p:nvSpPr>
+        <p:spPr/>
+        <p:txBody>
+          <a:bodyPr>
+            <a:normAutofit fontScale="90000"/>
+          </a:bodyPr>
+          <a:lstStyle/>
+          <a:p>
+            <a:r>
+              <a:rPr lang="en-US" b="1" dirty="0" smtClean="0"/>
+              <a:t>Lesson 1: Triangle and Quad (</a:t>
+            </a:r>
+            <a:r>
+              <a:rPr lang="en-US" b="1" dirty="0" err="1" smtClean="0"/>
+              <a:t>Three.js</a:t>
+            </a:r>
+            <a:r>
+              <a:rPr lang="en-US" b="1" dirty="0" smtClean="0"/>
+              <a:t>)</a:t>
+            </a:r>
+            <a:endParaRPr lang="en-US" b="1" dirty="0"/>
+          </a:p>
+        </p:txBody>
+      </p:sp>
+      <p:sp>
+        <p:nvSpPr>
+          <p:cNvPr id="3" name="Content Placeholder 2"/>
+          <p:cNvSpPr>
+            <a:spLocks noGrp="1"/>
+          </p:cNvSpPr>
+          <p:nvPr>
+            <p:ph idx="1"/>
+          </p:nvPr>
+        </p:nvSpPr>
+        <p:spPr/>
+        <p:txBody>
+          <a:bodyPr/>
+          <a:lstStyle/>
+          <a:p>
+            <a:r>
+              <a:rPr lang="en-US" dirty="0" err="1" smtClean="0"/>
+              <a:t>Three.js</a:t>
+            </a:r>
+            <a:endParaRPr lang="en-US" dirty="0"/>
+          </a:p>
+        </p:txBody>
+      </p:sp>
+    </p:spTree>
+    <p:extLst>
+      <p:ext uri="{BB962C8B-B14F-4D97-AF65-F5344CB8AC3E}">
+        <p14:creationId xmlns:p14="http://schemas.microsoft.com/office/powerpoint/2010/main" val="1647454612"/>
+      </p:ext>
+    </p:extLst>
+  </p:cSld>
+  <p:clrMapOvr>
+    <a:masterClrMapping/>
+  </p:clrMapOvr>
+  <mc:AlternateContent xmlns:mc="http://schemas.openxmlformats.org/markup-compatibility/2006">
+    <mc:Choice xmlns:p14="http://schemas.microsoft.com/office/powerpoint/2010/main" Requires="p14">
+      <p:transition spd="slow" p14:dur="2000"/>
+    </mc:Choice>
+    <mc:Fallback>
+      <p:transition xmlns:p14="http://schemas.microsoft.com/office/powerpoint/2010/main" spd="slow"/>
+    </mc:Fallback>
+  </mc:AlternateContent>
+  <p:timing>
+    <p:tnLst>
+      <p:par>
+        <p:cTn xmlns:p14="http://schemas.microsoft.com/office/powerpoint/2010/main" id="1" dur="indefinite" restart="never" nodeType="tmRoot"/>
+      </p:par>
+    </p:tnLst>
+  </p:timing>
+</p:sld>
+</file>
+
+<file path=ppt/slides/slide52.xml><?xml version="1.0" encoding="utf-8"?>
+<p:sld xmlns:a="http://schemas.openxmlformats.org/drawingml/2006/main" xmlns:r="http://schemas.openxmlformats.org/officeDocument/2006/relationships" xmlns:p="http://schemas.openxmlformats.org/presentationml/2006/main" show="0">
+  <p:cSld>
+    <p:spTree>
+      <p:nvGrpSpPr>
+        <p:cNvPr id="1" name=""/>
+        <p:cNvGrpSpPr/>
+        <p:nvPr/>
+      </p:nvGrpSpPr>
+      <p:grpSpPr>
+        <a:xfrm>
+          <a:off x="0" y="0"/>
+          <a:ext cx="0" cy="0"/>
+          <a:chOff x="0" y="0"/>
+          <a:chExt cx="0" cy="0"/>
+        </a:xfrm>
+      </p:grpSpPr>
+      <p:sp>
+        <p:nvSpPr>
+          <p:cNvPr id="2" name="Title 1"/>
+          <p:cNvSpPr>
+            <a:spLocks noGrp="1"/>
+          </p:cNvSpPr>
+          <p:nvPr>
+            <p:ph type="title"/>
+          </p:nvPr>
+        </p:nvSpPr>
+        <p:spPr/>
+        <p:txBody>
+          <a:bodyPr/>
+          <a:lstStyle/>
+          <a:p>
+            <a:r>
+              <a:rPr lang="en-US" b="1" dirty="0" err="1" smtClean="0"/>
+              <a:t>Three.js</a:t>
+            </a:r>
+            <a:r>
+              <a:rPr lang="en-US" b="1" dirty="0" smtClean="0"/>
+              <a:t> Mesh Loader</a:t>
+            </a:r>
+            <a:endParaRPr lang="en-US" b="1" dirty="0"/>
+          </a:p>
+        </p:txBody>
+      </p:sp>
+      <p:sp>
+        <p:nvSpPr>
+          <p:cNvPr id="3" name="Content Placeholder 2"/>
+          <p:cNvSpPr>
+            <a:spLocks noGrp="1"/>
+          </p:cNvSpPr>
+          <p:nvPr>
+            <p:ph idx="1"/>
+          </p:nvPr>
+        </p:nvSpPr>
+        <p:spPr/>
+        <p:txBody>
+          <a:bodyPr/>
+          <a:lstStyle/>
+          <a:p>
+            <a:r>
+              <a:rPr lang="en-US" dirty="0" smtClean="0"/>
+              <a:t>Simple tutorial </a:t>
+            </a:r>
+            <a:r>
+              <a:rPr lang="en-US" dirty="0" err="1" smtClean="0"/>
+              <a:t>three.js</a:t>
+            </a:r>
+            <a:endParaRPr lang="en-US" dirty="0"/>
+          </a:p>
+        </p:txBody>
+      </p:sp>
+    </p:spTree>
+    <p:extLst>
+      <p:ext uri="{BB962C8B-B14F-4D97-AF65-F5344CB8AC3E}">
+        <p14:creationId xmlns:p14="http://schemas.microsoft.com/office/powerpoint/2010/main" val="2826869002"/>
+      </p:ext>
+    </p:extLst>
+  </p:cSld>
+  <p:clrMapOvr>
+    <a:masterClrMapping/>
+  </p:clrMapOvr>
+  <mc:AlternateContent xmlns:mc="http://schemas.openxmlformats.org/markup-compatibility/2006">
+    <mc:Choice xmlns:p14="http://schemas.microsoft.com/office/powerpoint/2010/main" Requires="p14">
+      <p:transition spd="slow" p14:dur="2000"/>
+    </mc:Choice>
+    <mc:Fallback>
+      <p:transition xmlns:p14="http://schemas.microsoft.com/office/powerpoint/2010/main" spd="slow"/>
+    </mc:Fallback>
+  </mc:AlternateContent>
   <p:timing>
     <p:tnLst>
       <p:par>
@@ -19768,11 +24060,7 @@
             </a:r>
             <a:r>
               <a:rPr lang="en-US" dirty="0" smtClean="0"/>
-              <a:t> </a:t>
-            </a:r>
-            <a:r>
-              <a:rPr lang="en-US" dirty="0" smtClean="0"/>
-              <a:t>(also, </a:t>
+              <a:t> (also, </a:t>
             </a:r>
             <a:r>
               <a:rPr lang="en-US" dirty="0" smtClean="0">

</xml_diff>